<commit_message>
add figs and fix soil moisture part of the discussion. need to condense
</commit_message>
<xml_diff>
--- a/working_drafts/figs/TXeco_fig5_SEM.pptx
+++ b/working_drafts/figs/TXeco_fig5_SEM.pptx
@@ -201,7 +201,7 @@
           <a:p>
             <a:fld id="{9C8338E3-F40D-F146-8D3B-4726E84D5200}" type="datetimeFigureOut">
               <a:rPr lang="en-US" smtClean="0"/>
-              <a:t>9/19/23</a:t>
+              <a:t>9/22/23</a:t>
             </a:fld>
             <a:endParaRPr lang="en-US"/>
           </a:p>
@@ -1024,7 +1024,7 @@
           <a:p>
             <a:fld id="{D3A28AA4-801E-B147-9E5C-6E6DBA6E23D1}" type="datetimeFigureOut">
               <a:rPr lang="en-US" smtClean="0"/>
-              <a:t>9/19/23</a:t>
+              <a:t>9/22/23</a:t>
             </a:fld>
             <a:endParaRPr lang="en-US"/>
           </a:p>
@@ -1194,7 +1194,7 @@
           <a:p>
             <a:fld id="{D3A28AA4-801E-B147-9E5C-6E6DBA6E23D1}" type="datetimeFigureOut">
               <a:rPr lang="en-US" smtClean="0"/>
-              <a:t>9/19/23</a:t>
+              <a:t>9/22/23</a:t>
             </a:fld>
             <a:endParaRPr lang="en-US"/>
           </a:p>
@@ -1374,7 +1374,7 @@
           <a:p>
             <a:fld id="{D3A28AA4-801E-B147-9E5C-6E6DBA6E23D1}" type="datetimeFigureOut">
               <a:rPr lang="en-US" smtClean="0"/>
-              <a:t>9/19/23</a:t>
+              <a:t>9/22/23</a:t>
             </a:fld>
             <a:endParaRPr lang="en-US"/>
           </a:p>
@@ -1544,7 +1544,7 @@
           <a:p>
             <a:fld id="{D3A28AA4-801E-B147-9E5C-6E6DBA6E23D1}" type="datetimeFigureOut">
               <a:rPr lang="en-US" smtClean="0"/>
-              <a:t>9/19/23</a:t>
+              <a:t>9/22/23</a:t>
             </a:fld>
             <a:endParaRPr lang="en-US"/>
           </a:p>
@@ -1788,7 +1788,7 @@
           <a:p>
             <a:fld id="{D3A28AA4-801E-B147-9E5C-6E6DBA6E23D1}" type="datetimeFigureOut">
               <a:rPr lang="en-US" smtClean="0"/>
-              <a:t>9/19/23</a:t>
+              <a:t>9/22/23</a:t>
             </a:fld>
             <a:endParaRPr lang="en-US"/>
           </a:p>
@@ -2020,7 +2020,7 @@
           <a:p>
             <a:fld id="{D3A28AA4-801E-B147-9E5C-6E6DBA6E23D1}" type="datetimeFigureOut">
               <a:rPr lang="en-US" smtClean="0"/>
-              <a:t>9/19/23</a:t>
+              <a:t>9/22/23</a:t>
             </a:fld>
             <a:endParaRPr lang="en-US"/>
           </a:p>
@@ -2387,7 +2387,7 @@
           <a:p>
             <a:fld id="{D3A28AA4-801E-B147-9E5C-6E6DBA6E23D1}" type="datetimeFigureOut">
               <a:rPr lang="en-US" smtClean="0"/>
-              <a:t>9/19/23</a:t>
+              <a:t>9/22/23</a:t>
             </a:fld>
             <a:endParaRPr lang="en-US"/>
           </a:p>
@@ -2505,7 +2505,7 @@
           <a:p>
             <a:fld id="{D3A28AA4-801E-B147-9E5C-6E6DBA6E23D1}" type="datetimeFigureOut">
               <a:rPr lang="en-US" smtClean="0"/>
-              <a:t>9/19/23</a:t>
+              <a:t>9/22/23</a:t>
             </a:fld>
             <a:endParaRPr lang="en-US"/>
           </a:p>
@@ -2600,7 +2600,7 @@
           <a:p>
             <a:fld id="{D3A28AA4-801E-B147-9E5C-6E6DBA6E23D1}" type="datetimeFigureOut">
               <a:rPr lang="en-US" smtClean="0"/>
-              <a:t>9/19/23</a:t>
+              <a:t>9/22/23</a:t>
             </a:fld>
             <a:endParaRPr lang="en-US"/>
           </a:p>
@@ -2877,7 +2877,7 @@
           <a:p>
             <a:fld id="{D3A28AA4-801E-B147-9E5C-6E6DBA6E23D1}" type="datetimeFigureOut">
               <a:rPr lang="en-US" smtClean="0"/>
-              <a:t>9/19/23</a:t>
+              <a:t>9/22/23</a:t>
             </a:fld>
             <a:endParaRPr lang="en-US"/>
           </a:p>
@@ -3134,7 +3134,7 @@
           <a:p>
             <a:fld id="{D3A28AA4-801E-B147-9E5C-6E6DBA6E23D1}" type="datetimeFigureOut">
               <a:rPr lang="en-US" smtClean="0"/>
-              <a:t>9/19/23</a:t>
+              <a:t>9/22/23</a:t>
             </a:fld>
             <a:endParaRPr lang="en-US"/>
           </a:p>
@@ -3347,7 +3347,7 @@
           <a:p>
             <a:fld id="{D3A28AA4-801E-B147-9E5C-6E6DBA6E23D1}" type="datetimeFigureOut">
               <a:rPr lang="en-US" smtClean="0"/>
-              <a:t>9/19/23</a:t>
+              <a:t>9/22/23</a:t>
             </a:fld>
             <a:endParaRPr lang="en-US"/>
           </a:p>
@@ -13393,6 +13393,101 @@
       </p:grpSpPr>
       <p:cxnSp>
         <p:nvCxnSpPr>
+          <p:cNvPr id="169" name="Elbow Connector 168">
+            <a:extLst>
+              <a:ext uri="{FF2B5EF4-FFF2-40B4-BE49-F238E27FC236}">
+                <a16:creationId xmlns:a16="http://schemas.microsoft.com/office/drawing/2014/main" id="{E9C4FFF5-B216-F1F1-94F2-316CF4741880}"/>
+              </a:ext>
+            </a:extLst>
+          </p:cNvPr>
+          <p:cNvCxnSpPr>
+            <a:cxnSpLocks/>
+          </p:cNvCxnSpPr>
+          <p:nvPr/>
+        </p:nvCxnSpPr>
+        <p:spPr>
+          <a:xfrm flipV="1">
+            <a:off x="13445941" y="12219519"/>
+            <a:ext cx="3786813" cy="1934370"/>
+          </a:xfrm>
+          <a:prstGeom prst="bentConnector3">
+            <a:avLst>
+              <a:gd name="adj1" fmla="val 77877"/>
+            </a:avLst>
+          </a:prstGeom>
+          <a:ln w="85090">
+            <a:solidFill>
+              <a:schemeClr val="accent1">
+                <a:lumMod val="75000"/>
+                <a:alpha val="50000"/>
+              </a:schemeClr>
+            </a:solidFill>
+          </a:ln>
+        </p:spPr>
+        <p:style>
+          <a:lnRef idx="1">
+            <a:schemeClr val="accent1"/>
+          </a:lnRef>
+          <a:fillRef idx="0">
+            <a:schemeClr val="accent1"/>
+          </a:fillRef>
+          <a:effectRef idx="0">
+            <a:schemeClr val="accent1"/>
+          </a:effectRef>
+          <a:fontRef idx="minor">
+            <a:schemeClr val="tx1"/>
+          </a:fontRef>
+        </p:style>
+      </p:cxnSp>
+      <p:cxnSp>
+        <p:nvCxnSpPr>
+          <p:cNvPr id="172" name="Straight Arrow Connector 171">
+            <a:extLst>
+              <a:ext uri="{FF2B5EF4-FFF2-40B4-BE49-F238E27FC236}">
+                <a16:creationId xmlns:a16="http://schemas.microsoft.com/office/drawing/2014/main" id="{99A7F893-3C94-27E1-A247-0543276C4529}"/>
+              </a:ext>
+            </a:extLst>
+          </p:cNvPr>
+          <p:cNvCxnSpPr>
+            <a:cxnSpLocks/>
+          </p:cNvCxnSpPr>
+          <p:nvPr/>
+        </p:nvCxnSpPr>
+        <p:spPr>
+          <a:xfrm flipV="1">
+            <a:off x="17215605" y="11628113"/>
+            <a:ext cx="0" cy="634790"/>
+          </a:xfrm>
+          <a:prstGeom prst="straightConnector1">
+            <a:avLst/>
+          </a:prstGeom>
+          <a:ln w="85090">
+            <a:solidFill>
+              <a:schemeClr val="accent1">
+                <a:lumMod val="75000"/>
+                <a:alpha val="50000"/>
+              </a:schemeClr>
+            </a:solidFill>
+            <a:tailEnd type="triangle"/>
+          </a:ln>
+        </p:spPr>
+        <p:style>
+          <a:lnRef idx="1">
+            <a:schemeClr val="accent1"/>
+          </a:lnRef>
+          <a:fillRef idx="0">
+            <a:schemeClr val="accent1"/>
+          </a:fillRef>
+          <a:effectRef idx="0">
+            <a:schemeClr val="accent1"/>
+          </a:effectRef>
+          <a:fontRef idx="minor">
+            <a:schemeClr val="tx1"/>
+          </a:fontRef>
+        </p:style>
+      </p:cxnSp>
+      <p:cxnSp>
+        <p:nvCxnSpPr>
           <p:cNvPr id="138" name="Straight Arrow Connector 137">
             <a:extLst>
               <a:ext uri="{FF2B5EF4-FFF2-40B4-BE49-F238E27FC236}">
@@ -13459,58 +13554,11 @@
               <a:gd name="adj1" fmla="val 742"/>
             </a:avLst>
           </a:prstGeom>
-          <a:ln w="33655">
-            <a:solidFill>
-              <a:schemeClr val="accent1">
-                <a:lumMod val="75000"/>
+          <a:ln w="37592">
+            <a:solidFill>
+              <a:srgbClr val="C00000">
                 <a:alpha val="50000"/>
-              </a:schemeClr>
-            </a:solidFill>
-            <a:tailEnd type="triangle"/>
-          </a:ln>
-        </p:spPr>
-        <p:style>
-          <a:lnRef idx="1">
-            <a:schemeClr val="accent1"/>
-          </a:lnRef>
-          <a:fillRef idx="0">
-            <a:schemeClr val="accent1"/>
-          </a:fillRef>
-          <a:effectRef idx="0">
-            <a:schemeClr val="accent1"/>
-          </a:effectRef>
-          <a:fontRef idx="minor">
-            <a:schemeClr val="tx1"/>
-          </a:fontRef>
-        </p:style>
-      </p:cxnSp>
-      <p:cxnSp>
-        <p:nvCxnSpPr>
-          <p:cNvPr id="31" name="Elbow Connector 30">
-            <a:extLst>
-              <a:ext uri="{FF2B5EF4-FFF2-40B4-BE49-F238E27FC236}">
-                <a16:creationId xmlns:a16="http://schemas.microsoft.com/office/drawing/2014/main" id="{C7EFE26F-7F6A-1C58-17DB-D9A4DE6DA6A4}"/>
-              </a:ext>
-            </a:extLst>
-          </p:cNvPr>
-          <p:cNvCxnSpPr>
-            <a:cxnSpLocks/>
-          </p:cNvCxnSpPr>
-          <p:nvPr/>
-        </p:nvCxnSpPr>
-        <p:spPr>
-          <a:xfrm rot="16200000" flipH="1">
-            <a:off x="10588195" y="10919370"/>
-            <a:ext cx="601182" cy="1459355"/>
-          </a:xfrm>
-          <a:prstGeom prst="bentConnector2">
-            <a:avLst/>
-          </a:prstGeom>
-          <a:ln w="21463">
-            <a:solidFill>
-              <a:schemeClr val="accent1">
-                <a:lumMod val="75000"/>
-              </a:schemeClr>
+              </a:srgbClr>
             </a:solidFill>
             <a:tailEnd type="triangle"/>
           </a:ln>
@@ -13552,7 +13600,7 @@
           <a:prstGeom prst="bentConnector2">
             <a:avLst/>
           </a:prstGeom>
-          <a:ln w="17780">
+          <a:ln w="17653">
             <a:solidFill>
               <a:srgbClr val="C00000"/>
             </a:solidFill>
@@ -13611,32 +13659,34 @@
       </p:sp>
       <p:cxnSp>
         <p:nvCxnSpPr>
-          <p:cNvPr id="43" name="Straight Arrow Connector 42">
-            <a:extLst>
-              <a:ext uri="{FF2B5EF4-FFF2-40B4-BE49-F238E27FC236}">
-                <a16:creationId xmlns:a16="http://schemas.microsoft.com/office/drawing/2014/main" id="{6C8D84F6-E7F2-457E-C6CE-71B0F87335B1}"/>
+          <p:cNvPr id="158" name="Straight Arrow Connector 157">
+            <a:extLst>
+              <a:ext uri="{FF2B5EF4-FFF2-40B4-BE49-F238E27FC236}">
+                <a16:creationId xmlns:a16="http://schemas.microsoft.com/office/drawing/2014/main" id="{774FBE6D-425A-614C-E507-AC3AF7F3D74F}"/>
               </a:ext>
             </a:extLst>
           </p:cNvPr>
           <p:cNvCxnSpPr>
-            <a:cxnSpLocks/>
+            <a:stCxn id="28" idx="2"/>
+            <a:endCxn id="23" idx="0"/>
           </p:cNvCxnSpPr>
           <p:nvPr/>
         </p:nvCxnSpPr>
         <p:spPr>
           <a:xfrm>
-            <a:off x="13437862" y="12179286"/>
-            <a:ext cx="892510" cy="0"/>
+            <a:off x="12528163" y="10652037"/>
+            <a:ext cx="0" cy="1099316"/>
           </a:xfrm>
           <a:prstGeom prst="straightConnector1">
             <a:avLst/>
           </a:prstGeom>
-          <a:ln w="66675">
-            <a:solidFill>
-              <a:schemeClr val="accent1">
-                <a:lumMod val="75000"/>
+          <a:ln w="23114">
+            <a:solidFill>
+              <a:schemeClr val="bg1">
+                <a:lumMod val="65000"/>
               </a:schemeClr>
             </a:solidFill>
+            <a:prstDash val="sysDash"/>
             <a:tailEnd type="triangle"/>
           </a:ln>
         </p:spPr>
@@ -13657,10 +13707,10 @@
       </p:cxnSp>
       <p:cxnSp>
         <p:nvCxnSpPr>
-          <p:cNvPr id="45" name="Straight Arrow Connector 44">
-            <a:extLst>
-              <a:ext uri="{FF2B5EF4-FFF2-40B4-BE49-F238E27FC236}">
-                <a16:creationId xmlns:a16="http://schemas.microsoft.com/office/drawing/2014/main" id="{6071B235-6C4D-6C35-571A-EA3AE9A92167}"/>
+          <p:cNvPr id="53" name="Elbow Connector 52">
+            <a:extLst>
+              <a:ext uri="{FF2B5EF4-FFF2-40B4-BE49-F238E27FC236}">
+                <a16:creationId xmlns:a16="http://schemas.microsoft.com/office/drawing/2014/main" id="{94EF1EEE-0B30-C75D-DC46-54C3B91F6064}"/>
               </a:ext>
             </a:extLst>
           </p:cNvPr>
@@ -13670,16 +13720,22 @@
           <p:nvPr/>
         </p:nvCxnSpPr>
         <p:spPr>
-          <a:xfrm>
-            <a:off x="14752676" y="10642604"/>
-            <a:ext cx="0" cy="1098071"/>
-          </a:xfrm>
-          <a:prstGeom prst="straightConnector1">
-            <a:avLst/>
-          </a:prstGeom>
-          <a:ln w="19685">
-            <a:solidFill>
-              <a:srgbClr val="C00000"/>
+          <a:xfrm flipV="1">
+            <a:off x="10112183" y="10712543"/>
+            <a:ext cx="7049147" cy="2539909"/>
+          </a:xfrm>
+          <a:prstGeom prst="bentConnector4">
+            <a:avLst>
+              <a:gd name="adj1" fmla="val -27607"/>
+              <a:gd name="adj2" fmla="val 151884"/>
+            </a:avLst>
+          </a:prstGeom>
+          <a:ln w="42926">
+            <a:solidFill>
+              <a:schemeClr val="accent1">
+                <a:lumMod val="75000"/>
+                <a:alpha val="50000"/>
+              </a:schemeClr>
             </a:solidFill>
             <a:tailEnd type="triangle"/>
           </a:ln>
@@ -13701,898 +13757,6 @@
       </p:cxnSp>
       <p:cxnSp>
         <p:nvCxnSpPr>
-          <p:cNvPr id="50" name="Elbow Connector 49">
-            <a:extLst>
-              <a:ext uri="{FF2B5EF4-FFF2-40B4-BE49-F238E27FC236}">
-                <a16:creationId xmlns:a16="http://schemas.microsoft.com/office/drawing/2014/main" id="{1A91E203-0108-68AF-3E35-4118D6B6B8BA}"/>
-              </a:ext>
-            </a:extLst>
-          </p:cNvPr>
-          <p:cNvCxnSpPr>
-            <a:stCxn id="24" idx="0"/>
-            <a:endCxn id="20" idx="1"/>
-          </p:cNvCxnSpPr>
-          <p:nvPr/>
-        </p:nvCxnSpPr>
-        <p:spPr>
-          <a:xfrm rot="5400000" flipH="1" flipV="1">
-            <a:off x="15708645" y="10693420"/>
-            <a:ext cx="589520" cy="1504991"/>
-          </a:xfrm>
-          <a:prstGeom prst="bentConnector2">
-            <a:avLst/>
-          </a:prstGeom>
-          <a:ln w="36449">
-            <a:solidFill>
-              <a:schemeClr val="bg1">
-                <a:lumMod val="75000"/>
-              </a:schemeClr>
-            </a:solidFill>
-            <a:prstDash val="sysDash"/>
-            <a:tailEnd type="triangle"/>
-          </a:ln>
-        </p:spPr>
-        <p:style>
-          <a:lnRef idx="1">
-            <a:schemeClr val="accent1"/>
-          </a:lnRef>
-          <a:fillRef idx="0">
-            <a:schemeClr val="accent1"/>
-          </a:fillRef>
-          <a:effectRef idx="0">
-            <a:schemeClr val="accent1"/>
-          </a:effectRef>
-          <a:fontRef idx="minor">
-            <a:schemeClr val="tx1"/>
-          </a:fontRef>
-        </p:style>
-      </p:cxnSp>
-      <p:cxnSp>
-        <p:nvCxnSpPr>
-          <p:cNvPr id="51" name="Elbow Connector 50">
-            <a:extLst>
-              <a:ext uri="{FF2B5EF4-FFF2-40B4-BE49-F238E27FC236}">
-                <a16:creationId xmlns:a16="http://schemas.microsoft.com/office/drawing/2014/main" id="{4B9A6050-891E-DD21-BF59-4A2C98309D21}"/>
-              </a:ext>
-            </a:extLst>
-          </p:cNvPr>
-          <p:cNvCxnSpPr>
-            <a:cxnSpLocks/>
-            <a:stCxn id="24" idx="2"/>
-            <a:endCxn id="17" idx="1"/>
-          </p:cNvCxnSpPr>
-          <p:nvPr/>
-        </p:nvCxnSpPr>
-        <p:spPr>
-          <a:xfrm rot="16200000" flipH="1">
-            <a:off x="15686128" y="12182679"/>
-            <a:ext cx="634555" cy="1504991"/>
-          </a:xfrm>
-          <a:prstGeom prst="bentConnector2">
-            <a:avLst/>
-          </a:prstGeom>
-          <a:ln w="63119">
-            <a:solidFill>
-              <a:srgbClr val="C00000"/>
-            </a:solidFill>
-            <a:tailEnd type="triangle"/>
-          </a:ln>
-        </p:spPr>
-        <p:style>
-          <a:lnRef idx="1">
-            <a:schemeClr val="accent1"/>
-          </a:lnRef>
-          <a:fillRef idx="0">
-            <a:schemeClr val="accent1"/>
-          </a:fillRef>
-          <a:effectRef idx="0">
-            <a:schemeClr val="accent1"/>
-          </a:effectRef>
-          <a:fontRef idx="minor">
-            <a:schemeClr val="tx1"/>
-          </a:fontRef>
-        </p:style>
-      </p:cxnSp>
-      <p:cxnSp>
-        <p:nvCxnSpPr>
-          <p:cNvPr id="57" name="Elbow Connector 56">
-            <a:extLst>
-              <a:ext uri="{FF2B5EF4-FFF2-40B4-BE49-F238E27FC236}">
-                <a16:creationId xmlns:a16="http://schemas.microsoft.com/office/drawing/2014/main" id="{C692133E-2952-0ECD-87D3-B8F051B6F346}"/>
-              </a:ext>
-            </a:extLst>
-          </p:cNvPr>
-          <p:cNvCxnSpPr>
-            <a:cxnSpLocks/>
-            <a:stCxn id="20" idx="0"/>
-            <a:endCxn id="11" idx="0"/>
-          </p:cNvCxnSpPr>
-          <p:nvPr/>
-        </p:nvCxnSpPr>
-        <p:spPr>
-          <a:xfrm rot="16200000" flipH="1">
-            <a:off x="18273408" y="10104734"/>
-            <a:ext cx="1061295" cy="2276912"/>
-          </a:xfrm>
-          <a:prstGeom prst="bentConnector3">
-            <a:avLst>
-              <a:gd name="adj1" fmla="val -21540"/>
-            </a:avLst>
-          </a:prstGeom>
-          <a:ln w="187198">
-            <a:solidFill>
-              <a:schemeClr val="accent1">
-                <a:lumMod val="75000"/>
-              </a:schemeClr>
-            </a:solidFill>
-            <a:tailEnd type="triangle"/>
-          </a:ln>
-        </p:spPr>
-        <p:style>
-          <a:lnRef idx="1">
-            <a:schemeClr val="accent1"/>
-          </a:lnRef>
-          <a:fillRef idx="0">
-            <a:schemeClr val="accent1"/>
-          </a:fillRef>
-          <a:effectRef idx="0">
-            <a:schemeClr val="accent1"/>
-          </a:effectRef>
-          <a:fontRef idx="minor">
-            <a:schemeClr val="tx1"/>
-          </a:fontRef>
-        </p:style>
-      </p:cxnSp>
-      <p:cxnSp>
-        <p:nvCxnSpPr>
-          <p:cNvPr id="58" name="Elbow Connector 57">
-            <a:extLst>
-              <a:ext uri="{FF2B5EF4-FFF2-40B4-BE49-F238E27FC236}">
-                <a16:creationId xmlns:a16="http://schemas.microsoft.com/office/drawing/2014/main" id="{2A6C5F73-DA31-2131-4A22-7E2D5FC27865}"/>
-              </a:ext>
-            </a:extLst>
-          </p:cNvPr>
-          <p:cNvCxnSpPr>
-            <a:cxnSpLocks/>
-            <a:stCxn id="17" idx="2"/>
-            <a:endCxn id="11" idx="2"/>
-          </p:cNvCxnSpPr>
-          <p:nvPr/>
-        </p:nvCxnSpPr>
-        <p:spPr>
-          <a:xfrm rot="5400000" flipH="1" flipV="1">
-            <a:off x="18284054" y="12032607"/>
-            <a:ext cx="1040003" cy="2276912"/>
-          </a:xfrm>
-          <a:prstGeom prst="bentConnector3">
-            <a:avLst>
-              <a:gd name="adj1" fmla="val -21981"/>
-            </a:avLst>
-          </a:prstGeom>
-          <a:ln w="164719">
-            <a:solidFill>
-              <a:schemeClr val="accent1">
-                <a:lumMod val="75000"/>
-              </a:schemeClr>
-            </a:solidFill>
-            <a:tailEnd type="triangle"/>
-          </a:ln>
-        </p:spPr>
-        <p:style>
-          <a:lnRef idx="1">
-            <a:schemeClr val="accent1"/>
-          </a:lnRef>
-          <a:fillRef idx="0">
-            <a:schemeClr val="accent1"/>
-          </a:fillRef>
-          <a:effectRef idx="0">
-            <a:schemeClr val="accent1"/>
-          </a:effectRef>
-          <a:fontRef idx="minor">
-            <a:schemeClr val="tx1"/>
-          </a:fontRef>
-        </p:style>
-      </p:cxnSp>
-      <p:cxnSp>
-        <p:nvCxnSpPr>
-          <p:cNvPr id="158" name="Straight Arrow Connector 157">
-            <a:extLst>
-              <a:ext uri="{FF2B5EF4-FFF2-40B4-BE49-F238E27FC236}">
-                <a16:creationId xmlns:a16="http://schemas.microsoft.com/office/drawing/2014/main" id="{774FBE6D-425A-614C-E507-AC3AF7F3D74F}"/>
-              </a:ext>
-            </a:extLst>
-          </p:cNvPr>
-          <p:cNvCxnSpPr>
-            <a:stCxn id="28" idx="2"/>
-            <a:endCxn id="23" idx="0"/>
-          </p:cNvCxnSpPr>
-          <p:nvPr/>
-        </p:nvCxnSpPr>
-        <p:spPr>
-          <a:xfrm>
-            <a:off x="12528163" y="10652037"/>
-            <a:ext cx="0" cy="1099316"/>
-          </a:xfrm>
-          <a:prstGeom prst="straightConnector1">
-            <a:avLst/>
-          </a:prstGeom>
-          <a:ln w="23495">
-            <a:solidFill>
-              <a:schemeClr val="bg1">
-                <a:lumMod val="65000"/>
-              </a:schemeClr>
-            </a:solidFill>
-            <a:prstDash val="sysDash"/>
-            <a:tailEnd type="triangle"/>
-          </a:ln>
-        </p:spPr>
-        <p:style>
-          <a:lnRef idx="1">
-            <a:schemeClr val="accent1"/>
-          </a:lnRef>
-          <a:fillRef idx="0">
-            <a:schemeClr val="accent1"/>
-          </a:fillRef>
-          <a:effectRef idx="0">
-            <a:schemeClr val="accent1"/>
-          </a:effectRef>
-          <a:fontRef idx="minor">
-            <a:schemeClr val="tx1"/>
-          </a:fontRef>
-        </p:style>
-      </p:cxnSp>
-      <p:cxnSp>
-        <p:nvCxnSpPr>
-          <p:cNvPr id="160" name="Straight Arrow Connector 159">
-            <a:extLst>
-              <a:ext uri="{FF2B5EF4-FFF2-40B4-BE49-F238E27FC236}">
-                <a16:creationId xmlns:a16="http://schemas.microsoft.com/office/drawing/2014/main" id="{B7BC32FF-CA01-6112-27E7-E36B0ED38566}"/>
-              </a:ext>
-            </a:extLst>
-          </p:cNvPr>
-          <p:cNvCxnSpPr>
-            <a:stCxn id="12" idx="0"/>
-            <a:endCxn id="23" idx="2"/>
-          </p:cNvCxnSpPr>
-          <p:nvPr/>
-        </p:nvCxnSpPr>
-        <p:spPr>
-          <a:xfrm flipV="1">
-            <a:off x="12521813" y="12628576"/>
-            <a:ext cx="6350" cy="1079290"/>
-          </a:xfrm>
-          <a:prstGeom prst="straightConnector1">
-            <a:avLst/>
-          </a:prstGeom>
-          <a:ln w="172720">
-            <a:solidFill>
-              <a:schemeClr val="accent1">
-                <a:lumMod val="75000"/>
-              </a:schemeClr>
-            </a:solidFill>
-            <a:tailEnd type="triangle"/>
-          </a:ln>
-        </p:spPr>
-        <p:style>
-          <a:lnRef idx="1">
-            <a:schemeClr val="accent1"/>
-          </a:lnRef>
-          <a:fillRef idx="0">
-            <a:schemeClr val="accent1"/>
-          </a:fillRef>
-          <a:effectRef idx="0">
-            <a:schemeClr val="accent1"/>
-          </a:effectRef>
-          <a:fontRef idx="minor">
-            <a:schemeClr val="tx1"/>
-          </a:fontRef>
-        </p:style>
-      </p:cxnSp>
-      <p:sp>
-        <p:nvSpPr>
-          <p:cNvPr id="23" name="Rectangle 22">
-            <a:extLst>
-              <a:ext uri="{FF2B5EF4-FFF2-40B4-BE49-F238E27FC236}">
-                <a16:creationId xmlns:a16="http://schemas.microsoft.com/office/drawing/2014/main" id="{C3510981-FE55-509B-F5B4-9D8C4012346D}"/>
-              </a:ext>
-            </a:extLst>
-          </p:cNvPr>
-          <p:cNvSpPr/>
-          <p:nvPr/>
-        </p:nvSpPr>
-        <p:spPr>
-          <a:xfrm>
-            <a:off x="11618464" y="11751353"/>
-            <a:ext cx="1819398" cy="877223"/>
-          </a:xfrm>
-          <a:prstGeom prst="rect">
-            <a:avLst/>
-          </a:prstGeom>
-          <a:solidFill>
-            <a:schemeClr val="bg1"/>
-          </a:solidFill>
-          <a:ln w="38100">
-            <a:solidFill>
-              <a:schemeClr val="tx1"/>
-            </a:solidFill>
-          </a:ln>
-        </p:spPr>
-        <p:style>
-          <a:lnRef idx="2">
-            <a:schemeClr val="accent1">
-              <a:shade val="50000"/>
-            </a:schemeClr>
-          </a:lnRef>
-          <a:fillRef idx="1">
-            <a:schemeClr val="accent1"/>
-          </a:fillRef>
-          <a:effectRef idx="0">
-            <a:schemeClr val="accent1"/>
-          </a:effectRef>
-          <a:fontRef idx="minor">
-            <a:schemeClr val="lt1"/>
-          </a:fontRef>
-        </p:style>
-        <p:txBody>
-          <a:bodyPr rtlCol="0" anchor="ctr"/>
-          <a:lstStyle/>
-          <a:p>
-            <a:pPr algn="ctr"/>
-            <a:r>
-              <a:rPr lang="el-GR" sz="2400" b="1" i="1" dirty="0">
-                <a:solidFill>
-                  <a:schemeClr val="tx1"/>
-                </a:solidFill>
-                <a:latin typeface="Arial" panose="020B0604020202020204" pitchFamily="34" charset="0"/>
-                <a:cs typeface="Arial" panose="020B0604020202020204" pitchFamily="34" charset="0"/>
-              </a:rPr>
-              <a:t>β</a:t>
-            </a:r>
-            <a:endParaRPr lang="en-US" sz="2400" b="1" i="1" dirty="0">
-              <a:solidFill>
-                <a:schemeClr val="tx1"/>
-              </a:solidFill>
-              <a:latin typeface="Arial" panose="020B0604020202020204" pitchFamily="34" charset="0"/>
-              <a:cs typeface="Arial" panose="020B0604020202020204" pitchFamily="34" charset="0"/>
-            </a:endParaRPr>
-          </a:p>
-        </p:txBody>
-      </p:sp>
-      <p:sp>
-        <p:nvSpPr>
-          <p:cNvPr id="28" name="Rectangle 27">
-            <a:extLst>
-              <a:ext uri="{FF2B5EF4-FFF2-40B4-BE49-F238E27FC236}">
-                <a16:creationId xmlns:a16="http://schemas.microsoft.com/office/drawing/2014/main" id="{F9845BF1-920A-DFA4-A428-9653A04CD2C8}"/>
-              </a:ext>
-            </a:extLst>
-          </p:cNvPr>
-          <p:cNvSpPr/>
-          <p:nvPr/>
-        </p:nvSpPr>
-        <p:spPr>
-          <a:xfrm>
-            <a:off x="11618464" y="9774814"/>
-            <a:ext cx="1819398" cy="877223"/>
-          </a:xfrm>
-          <a:prstGeom prst="rect">
-            <a:avLst/>
-          </a:prstGeom>
-          <a:solidFill>
-            <a:schemeClr val="bg1"/>
-          </a:solidFill>
-          <a:ln w="38100">
-            <a:solidFill>
-              <a:schemeClr val="tx1"/>
-            </a:solidFill>
-          </a:ln>
-        </p:spPr>
-        <p:style>
-          <a:lnRef idx="2">
-            <a:schemeClr val="accent1">
-              <a:shade val="50000"/>
-            </a:schemeClr>
-          </a:lnRef>
-          <a:fillRef idx="1">
-            <a:schemeClr val="accent1"/>
-          </a:fillRef>
-          <a:effectRef idx="0">
-            <a:schemeClr val="accent1"/>
-          </a:effectRef>
-          <a:fontRef idx="minor">
-            <a:schemeClr val="lt1"/>
-          </a:fontRef>
-        </p:style>
-        <p:txBody>
-          <a:bodyPr rtlCol="0" anchor="ctr"/>
-          <a:lstStyle/>
-          <a:p>
-            <a:pPr algn="ctr"/>
-            <a:r>
-              <a:rPr lang="en-US" sz="2400" b="1" i="1" dirty="0">
-                <a:solidFill>
-                  <a:schemeClr val="tx1"/>
-                </a:solidFill>
-                <a:latin typeface="Arial" panose="020B0604020202020204" pitchFamily="34" charset="0"/>
-                <a:cs typeface="Arial" panose="020B0604020202020204" pitchFamily="34" charset="0"/>
-              </a:rPr>
-              <a:t>N</a:t>
-            </a:r>
-            <a:r>
-              <a:rPr lang="en-US" sz="2400" b="1" baseline="-25000" dirty="0">
-                <a:solidFill>
-                  <a:schemeClr val="tx1"/>
-                </a:solidFill>
-                <a:latin typeface="Arial" panose="020B0604020202020204" pitchFamily="34" charset="0"/>
-                <a:cs typeface="Arial" panose="020B0604020202020204" pitchFamily="34" charset="0"/>
-              </a:rPr>
-              <a:t>fixation</a:t>
-            </a:r>
-            <a:endParaRPr lang="en-US" sz="2400" i="1" dirty="0">
-              <a:solidFill>
-                <a:schemeClr val="tx1"/>
-              </a:solidFill>
-              <a:latin typeface="Arial" panose="020B0604020202020204" pitchFamily="34" charset="0"/>
-              <a:cs typeface="Arial" panose="020B0604020202020204" pitchFamily="34" charset="0"/>
-            </a:endParaRPr>
-          </a:p>
-        </p:txBody>
-      </p:sp>
-      <p:sp>
-        <p:nvSpPr>
-          <p:cNvPr id="11" name="Rectangle 10">
-            <a:extLst>
-              <a:ext uri="{FF2B5EF4-FFF2-40B4-BE49-F238E27FC236}">
-                <a16:creationId xmlns:a16="http://schemas.microsoft.com/office/drawing/2014/main" id="{612EA15D-68B8-4207-39F2-1F2B218F4B4D}"/>
-              </a:ext>
-            </a:extLst>
-          </p:cNvPr>
-          <p:cNvSpPr/>
-          <p:nvPr/>
-        </p:nvSpPr>
-        <p:spPr>
-          <a:xfrm>
-            <a:off x="19032813" y="11773838"/>
-            <a:ext cx="1819398" cy="877223"/>
-          </a:xfrm>
-          <a:prstGeom prst="rect">
-            <a:avLst/>
-          </a:prstGeom>
-          <a:solidFill>
-            <a:schemeClr val="bg1"/>
-          </a:solidFill>
-          <a:ln w="38100">
-            <a:solidFill>
-              <a:schemeClr val="tx1"/>
-            </a:solidFill>
-          </a:ln>
-        </p:spPr>
-        <p:style>
-          <a:lnRef idx="2">
-            <a:schemeClr val="accent1">
-              <a:shade val="50000"/>
-            </a:schemeClr>
-          </a:lnRef>
-          <a:fillRef idx="1">
-            <a:schemeClr val="accent1"/>
-          </a:fillRef>
-          <a:effectRef idx="0">
-            <a:schemeClr val="accent1"/>
-          </a:effectRef>
-          <a:fontRef idx="minor">
-            <a:schemeClr val="lt1"/>
-          </a:fontRef>
-        </p:style>
-        <p:txBody>
-          <a:bodyPr rtlCol="0" anchor="ctr"/>
-          <a:lstStyle/>
-          <a:p>
-            <a:pPr algn="ctr"/>
-            <a:r>
-              <a:rPr lang="el-GR" sz="2400" b="1" i="1" dirty="0">
-                <a:solidFill>
-                  <a:schemeClr val="tx1"/>
-                </a:solidFill>
-                <a:latin typeface="Arial" panose="020B0604020202020204" pitchFamily="34" charset="0"/>
-                <a:cs typeface="Arial" panose="020B0604020202020204" pitchFamily="34" charset="0"/>
-              </a:rPr>
-              <a:t>Ν</a:t>
-            </a:r>
-            <a:r>
-              <a:rPr lang="en-US" sz="2400" b="1" baseline="-25000" dirty="0">
-                <a:solidFill>
-                  <a:schemeClr val="tx1"/>
-                </a:solidFill>
-                <a:latin typeface="Arial" panose="020B0604020202020204" pitchFamily="34" charset="0"/>
-                <a:cs typeface="Arial" panose="020B0604020202020204" pitchFamily="34" charset="0"/>
-              </a:rPr>
-              <a:t>area</a:t>
-            </a:r>
-            <a:endParaRPr lang="en-US" sz="2400" b="1" i="1" dirty="0">
-              <a:solidFill>
-                <a:schemeClr val="tx1"/>
-              </a:solidFill>
-              <a:latin typeface="Arial" panose="020B0604020202020204" pitchFamily="34" charset="0"/>
-              <a:cs typeface="Arial" panose="020B0604020202020204" pitchFamily="34" charset="0"/>
-            </a:endParaRPr>
-          </a:p>
-        </p:txBody>
-      </p:sp>
-      <p:sp>
-        <p:nvSpPr>
-          <p:cNvPr id="17" name="Rectangle 16">
-            <a:extLst>
-              <a:ext uri="{FF2B5EF4-FFF2-40B4-BE49-F238E27FC236}">
-                <a16:creationId xmlns:a16="http://schemas.microsoft.com/office/drawing/2014/main" id="{5CF0D2AF-8598-6EDA-181B-6A30A35A32CE}"/>
-              </a:ext>
-            </a:extLst>
-          </p:cNvPr>
-          <p:cNvSpPr/>
-          <p:nvPr/>
-        </p:nvSpPr>
-        <p:spPr>
-          <a:xfrm>
-            <a:off x="16755901" y="12813841"/>
-            <a:ext cx="1819398" cy="877223"/>
-          </a:xfrm>
-          <a:prstGeom prst="rect">
-            <a:avLst/>
-          </a:prstGeom>
-          <a:solidFill>
-            <a:schemeClr val="bg1"/>
-          </a:solidFill>
-          <a:ln w="38100">
-            <a:solidFill>
-              <a:schemeClr val="tx1"/>
-            </a:solidFill>
-          </a:ln>
-        </p:spPr>
-        <p:style>
-          <a:lnRef idx="2">
-            <a:schemeClr val="accent1">
-              <a:shade val="50000"/>
-            </a:schemeClr>
-          </a:lnRef>
-          <a:fillRef idx="1">
-            <a:schemeClr val="accent1"/>
-          </a:fillRef>
-          <a:effectRef idx="0">
-            <a:schemeClr val="accent1"/>
-          </a:effectRef>
-          <a:fontRef idx="minor">
-            <a:schemeClr val="lt1"/>
-          </a:fontRef>
-        </p:style>
-        <p:txBody>
-          <a:bodyPr rtlCol="0" anchor="ctr"/>
-          <a:lstStyle/>
-          <a:p>
-            <a:pPr algn="ctr"/>
-            <a:r>
-              <a:rPr lang="en-US" sz="2400" b="1" i="1" dirty="0">
-                <a:solidFill>
-                  <a:schemeClr val="tx1"/>
-                </a:solidFill>
-                <a:latin typeface="Arial" panose="020B0604020202020204" pitchFamily="34" charset="0"/>
-                <a:cs typeface="Arial" panose="020B0604020202020204" pitchFamily="34" charset="0"/>
-              </a:rPr>
-              <a:t>M</a:t>
-            </a:r>
-            <a:r>
-              <a:rPr lang="en-US" sz="2400" b="1" baseline="-25000" dirty="0">
-                <a:solidFill>
-                  <a:schemeClr val="tx1"/>
-                </a:solidFill>
-                <a:latin typeface="Arial" panose="020B0604020202020204" pitchFamily="34" charset="0"/>
-                <a:cs typeface="Arial" panose="020B0604020202020204" pitchFamily="34" charset="0"/>
-              </a:rPr>
-              <a:t>area</a:t>
-            </a:r>
-            <a:endParaRPr lang="en-US" sz="2400" b="1" i="1" dirty="0">
-              <a:solidFill>
-                <a:schemeClr val="tx1"/>
-              </a:solidFill>
-              <a:latin typeface="Arial" panose="020B0604020202020204" pitchFamily="34" charset="0"/>
-              <a:cs typeface="Arial" panose="020B0604020202020204" pitchFamily="34" charset="0"/>
-            </a:endParaRPr>
-          </a:p>
-        </p:txBody>
-      </p:sp>
-      <p:sp>
-        <p:nvSpPr>
-          <p:cNvPr id="20" name="Rectangle 19">
-            <a:extLst>
-              <a:ext uri="{FF2B5EF4-FFF2-40B4-BE49-F238E27FC236}">
-                <a16:creationId xmlns:a16="http://schemas.microsoft.com/office/drawing/2014/main" id="{27FC6D2D-F10F-B106-3C23-5AEBE11DFAC5}"/>
-              </a:ext>
-            </a:extLst>
-          </p:cNvPr>
-          <p:cNvSpPr/>
-          <p:nvPr/>
-        </p:nvSpPr>
-        <p:spPr>
-          <a:xfrm>
-            <a:off x="16755901" y="10712543"/>
-            <a:ext cx="1819398" cy="877223"/>
-          </a:xfrm>
-          <a:prstGeom prst="rect">
-            <a:avLst/>
-          </a:prstGeom>
-          <a:solidFill>
-            <a:schemeClr val="bg1"/>
-          </a:solidFill>
-          <a:ln w="38100">
-            <a:solidFill>
-              <a:schemeClr val="tx1"/>
-            </a:solidFill>
-          </a:ln>
-        </p:spPr>
-        <p:style>
-          <a:lnRef idx="2">
-            <a:schemeClr val="accent1">
-              <a:shade val="50000"/>
-            </a:schemeClr>
-          </a:lnRef>
-          <a:fillRef idx="1">
-            <a:schemeClr val="accent1"/>
-          </a:fillRef>
-          <a:effectRef idx="0">
-            <a:schemeClr val="accent1"/>
-          </a:effectRef>
-          <a:fontRef idx="minor">
-            <a:schemeClr val="lt1"/>
-          </a:fontRef>
-        </p:style>
-        <p:txBody>
-          <a:bodyPr rtlCol="0" anchor="ctr"/>
-          <a:lstStyle/>
-          <a:p>
-            <a:pPr algn="ctr"/>
-            <a:r>
-              <a:rPr lang="en-US" sz="2400" b="1" i="1" dirty="0">
-                <a:solidFill>
-                  <a:schemeClr val="tx1"/>
-                </a:solidFill>
-                <a:latin typeface="Arial" panose="020B0604020202020204" pitchFamily="34" charset="0"/>
-                <a:cs typeface="Arial" panose="020B0604020202020204" pitchFamily="34" charset="0"/>
-              </a:rPr>
-              <a:t>N</a:t>
-            </a:r>
-            <a:r>
-              <a:rPr lang="en-US" sz="2400" b="1" baseline="-25000" dirty="0">
-                <a:solidFill>
-                  <a:schemeClr val="tx1"/>
-                </a:solidFill>
-                <a:latin typeface="Arial" panose="020B0604020202020204" pitchFamily="34" charset="0"/>
-                <a:cs typeface="Arial" panose="020B0604020202020204" pitchFamily="34" charset="0"/>
-              </a:rPr>
-              <a:t>mass</a:t>
-            </a:r>
-            <a:endParaRPr lang="en-US" sz="2400" b="1" i="1" dirty="0">
-              <a:solidFill>
-                <a:schemeClr val="tx1"/>
-              </a:solidFill>
-              <a:latin typeface="Arial" panose="020B0604020202020204" pitchFamily="34" charset="0"/>
-              <a:cs typeface="Arial" panose="020B0604020202020204" pitchFamily="34" charset="0"/>
-            </a:endParaRPr>
-          </a:p>
-        </p:txBody>
-      </p:sp>
-      <p:sp>
-        <p:nvSpPr>
-          <p:cNvPr id="24" name="Rectangle 23">
-            <a:extLst>
-              <a:ext uri="{FF2B5EF4-FFF2-40B4-BE49-F238E27FC236}">
-                <a16:creationId xmlns:a16="http://schemas.microsoft.com/office/drawing/2014/main" id="{B27ADCE2-63D0-A5FF-CAAC-360272DBA0BD}"/>
-              </a:ext>
-            </a:extLst>
-          </p:cNvPr>
-          <p:cNvSpPr/>
-          <p:nvPr/>
-        </p:nvSpPr>
-        <p:spPr>
-          <a:xfrm>
-            <a:off x="14341211" y="11740675"/>
-            <a:ext cx="1819398" cy="877223"/>
-          </a:xfrm>
-          <a:prstGeom prst="rect">
-            <a:avLst/>
-          </a:prstGeom>
-          <a:solidFill>
-            <a:schemeClr val="bg1"/>
-          </a:solidFill>
-          <a:ln w="38100">
-            <a:solidFill>
-              <a:schemeClr val="tx1"/>
-            </a:solidFill>
-          </a:ln>
-        </p:spPr>
-        <p:style>
-          <a:lnRef idx="2">
-            <a:schemeClr val="accent1">
-              <a:shade val="50000"/>
-            </a:schemeClr>
-          </a:lnRef>
-          <a:fillRef idx="1">
-            <a:schemeClr val="accent1"/>
-          </a:fillRef>
-          <a:effectRef idx="0">
-            <a:schemeClr val="accent1"/>
-          </a:effectRef>
-          <a:fontRef idx="minor">
-            <a:schemeClr val="lt1"/>
-          </a:fontRef>
-        </p:style>
-        <p:txBody>
-          <a:bodyPr rtlCol="0" anchor="ctr"/>
-          <a:lstStyle/>
-          <a:p>
-            <a:pPr algn="ctr"/>
-            <a:r>
-              <a:rPr lang="en-US" sz="2400" b="1" i="1" dirty="0">
-                <a:solidFill>
-                  <a:schemeClr val="tx1"/>
-                </a:solidFill>
-                <a:latin typeface="Arial" panose="020B0604020202020204" pitchFamily="34" charset="0"/>
-                <a:cs typeface="Arial" panose="020B0604020202020204" pitchFamily="34" charset="0"/>
-              </a:rPr>
-              <a:t>C</a:t>
-            </a:r>
-            <a:r>
-              <a:rPr lang="en-US" sz="2400" b="1" baseline="-25000" dirty="0">
-                <a:solidFill>
-                  <a:schemeClr val="tx1"/>
-                </a:solidFill>
-                <a:latin typeface="Arial" panose="020B0604020202020204" pitchFamily="34" charset="0"/>
-                <a:cs typeface="Arial" panose="020B0604020202020204" pitchFamily="34" charset="0"/>
-              </a:rPr>
-              <a:t>i</a:t>
-            </a:r>
-            <a:r>
-              <a:rPr lang="en-US" sz="2400" b="1" i="1" dirty="0">
-                <a:solidFill>
-                  <a:schemeClr val="tx1"/>
-                </a:solidFill>
-                <a:latin typeface="Arial" panose="020B0604020202020204" pitchFamily="34" charset="0"/>
-                <a:cs typeface="Arial" panose="020B0604020202020204" pitchFamily="34" charset="0"/>
-              </a:rPr>
-              <a:t>:C</a:t>
-            </a:r>
-            <a:r>
-              <a:rPr lang="en-US" sz="2400" b="1" baseline="-25000" dirty="0">
-                <a:solidFill>
-                  <a:schemeClr val="tx1"/>
-                </a:solidFill>
-                <a:latin typeface="Arial" panose="020B0604020202020204" pitchFamily="34" charset="0"/>
-                <a:cs typeface="Arial" panose="020B0604020202020204" pitchFamily="34" charset="0"/>
-              </a:rPr>
-              <a:t>a</a:t>
-            </a:r>
-          </a:p>
-        </p:txBody>
-      </p:sp>
-      <p:cxnSp>
-        <p:nvCxnSpPr>
-          <p:cNvPr id="53" name="Elbow Connector 52">
-            <a:extLst>
-              <a:ext uri="{FF2B5EF4-FFF2-40B4-BE49-F238E27FC236}">
-                <a16:creationId xmlns:a16="http://schemas.microsoft.com/office/drawing/2014/main" id="{94EF1EEE-0B30-C75D-DC46-54C3B91F6064}"/>
-              </a:ext>
-            </a:extLst>
-          </p:cNvPr>
-          <p:cNvCxnSpPr>
-            <a:cxnSpLocks/>
-          </p:cNvCxnSpPr>
-          <p:nvPr/>
-        </p:nvCxnSpPr>
-        <p:spPr>
-          <a:xfrm flipV="1">
-            <a:off x="10112183" y="10712543"/>
-            <a:ext cx="7049147" cy="2539909"/>
-          </a:xfrm>
-          <a:prstGeom prst="bentConnector4">
-            <a:avLst>
-              <a:gd name="adj1" fmla="val -27607"/>
-              <a:gd name="adj2" fmla="val 151884"/>
-            </a:avLst>
-          </a:prstGeom>
-          <a:ln w="43307">
-            <a:solidFill>
-              <a:schemeClr val="accent1">
-                <a:lumMod val="75000"/>
-                <a:alpha val="50000"/>
-              </a:schemeClr>
-            </a:solidFill>
-            <a:tailEnd type="triangle"/>
-          </a:ln>
-        </p:spPr>
-        <p:style>
-          <a:lnRef idx="1">
-            <a:schemeClr val="accent1"/>
-          </a:lnRef>
-          <a:fillRef idx="0">
-            <a:schemeClr val="accent1"/>
-          </a:fillRef>
-          <a:effectRef idx="0">
-            <a:schemeClr val="accent1"/>
-          </a:effectRef>
-          <a:fontRef idx="minor">
-            <a:schemeClr val="tx1"/>
-          </a:fontRef>
-        </p:style>
-      </p:cxnSp>
-      <p:sp>
-        <p:nvSpPr>
-          <p:cNvPr id="27" name="Rectangle 26">
-            <a:extLst>
-              <a:ext uri="{FF2B5EF4-FFF2-40B4-BE49-F238E27FC236}">
-                <a16:creationId xmlns:a16="http://schemas.microsoft.com/office/drawing/2014/main" id="{66815A72-A478-F607-8624-6D6512D0A23A}"/>
-              </a:ext>
-            </a:extLst>
-          </p:cNvPr>
-          <p:cNvSpPr/>
-          <p:nvPr/>
-        </p:nvSpPr>
-        <p:spPr>
-          <a:xfrm>
-            <a:off x="9153401" y="12824519"/>
-            <a:ext cx="2011416" cy="877223"/>
-          </a:xfrm>
-          <a:prstGeom prst="rect">
-            <a:avLst/>
-          </a:prstGeom>
-          <a:solidFill>
-            <a:schemeClr val="bg1"/>
-          </a:solidFill>
-          <a:ln w="38100">
-            <a:solidFill>
-              <a:schemeClr val="tx1"/>
-            </a:solidFill>
-          </a:ln>
-        </p:spPr>
-        <p:style>
-          <a:lnRef idx="2">
-            <a:schemeClr val="accent1">
-              <a:shade val="50000"/>
-            </a:schemeClr>
-          </a:lnRef>
-          <a:fillRef idx="1">
-            <a:schemeClr val="accent1"/>
-          </a:fillRef>
-          <a:effectRef idx="0">
-            <a:schemeClr val="accent1"/>
-          </a:effectRef>
-          <a:fontRef idx="minor">
-            <a:schemeClr val="lt1"/>
-          </a:fontRef>
-        </p:style>
-        <p:txBody>
-          <a:bodyPr rtlCol="0" anchor="ctr"/>
-          <a:lstStyle/>
-          <a:p>
-            <a:pPr algn="ctr"/>
-            <a:r>
-              <a:rPr lang="en-US" sz="2400" b="1" i="1" dirty="0">
-                <a:solidFill>
-                  <a:schemeClr val="tx1"/>
-                </a:solidFill>
-                <a:latin typeface="Arial" panose="020B0604020202020204" pitchFamily="34" charset="0"/>
-                <a:cs typeface="Arial" panose="020B0604020202020204" pitchFamily="34" charset="0"/>
-              </a:rPr>
-              <a:t>N availability</a:t>
-            </a:r>
-            <a:endParaRPr lang="en-US" sz="2400" b="1" dirty="0">
-              <a:solidFill>
-                <a:schemeClr val="tx1"/>
-              </a:solidFill>
-              <a:latin typeface="Arial" panose="020B0604020202020204" pitchFamily="34" charset="0"/>
-              <a:cs typeface="Arial" panose="020B0604020202020204" pitchFamily="34" charset="0"/>
-            </a:endParaRPr>
-          </a:p>
-        </p:txBody>
-      </p:sp>
-      <p:cxnSp>
-        <p:nvCxnSpPr>
           <p:cNvPr id="60" name="Straight Arrow Connector 59">
             <a:extLst>
               <a:ext uri="{FF2B5EF4-FFF2-40B4-BE49-F238E27FC236}">
@@ -14614,7 +13778,7 @@
           <a:prstGeom prst="straightConnector1">
             <a:avLst/>
           </a:prstGeom>
-          <a:ln w="69342">
+          <a:ln w="68961">
             <a:solidFill>
               <a:srgbClr val="C00000">
                 <a:alpha val="50000"/>
@@ -14660,7 +13824,7 @@
           <a:prstGeom prst="bentConnector2">
             <a:avLst/>
           </a:prstGeom>
-          <a:ln w="56515">
+          <a:ln w="56134">
             <a:solidFill>
               <a:schemeClr val="accent1">
                 <a:lumMod val="75000"/>
@@ -14685,76 +13849,6 @@
           </a:fontRef>
         </p:style>
       </p:cxnSp>
-      <p:sp>
-        <p:nvSpPr>
-          <p:cNvPr id="63" name="Rectangle 62">
-            <a:extLst>
-              <a:ext uri="{FF2B5EF4-FFF2-40B4-BE49-F238E27FC236}">
-                <a16:creationId xmlns:a16="http://schemas.microsoft.com/office/drawing/2014/main" id="{A947E591-BFFA-7599-D68F-6084C1444072}"/>
-              </a:ext>
-            </a:extLst>
-          </p:cNvPr>
-          <p:cNvSpPr/>
-          <p:nvPr/>
-        </p:nvSpPr>
-        <p:spPr>
-          <a:xfrm>
-            <a:off x="8447284" y="9569757"/>
-            <a:ext cx="1819398" cy="877223"/>
-          </a:xfrm>
-          <a:prstGeom prst="rect">
-            <a:avLst/>
-          </a:prstGeom>
-          <a:solidFill>
-            <a:schemeClr val="bg1"/>
-          </a:solidFill>
-          <a:ln w="38100">
-            <a:solidFill>
-              <a:schemeClr val="tx1"/>
-            </a:solidFill>
-          </a:ln>
-        </p:spPr>
-        <p:style>
-          <a:lnRef idx="2">
-            <a:schemeClr val="accent1">
-              <a:shade val="50000"/>
-            </a:schemeClr>
-          </a:lnRef>
-          <a:fillRef idx="1">
-            <a:schemeClr val="accent1"/>
-          </a:fillRef>
-          <a:effectRef idx="0">
-            <a:schemeClr val="accent1"/>
-          </a:effectRef>
-          <a:fontRef idx="minor">
-            <a:schemeClr val="lt1"/>
-          </a:fontRef>
-        </p:style>
-        <p:txBody>
-          <a:bodyPr rtlCol="0" anchor="ctr"/>
-          <a:lstStyle/>
-          <a:p>
-            <a:pPr algn="ctr"/>
-            <a:r>
-              <a:rPr lang="en-US" sz="2400" b="1" i="1" dirty="0">
-                <a:solidFill>
-                  <a:schemeClr val="tx1"/>
-                </a:solidFill>
-                <a:latin typeface="Arial" panose="020B0604020202020204" pitchFamily="34" charset="0"/>
-                <a:cs typeface="Arial" panose="020B0604020202020204" pitchFamily="34" charset="0"/>
-              </a:rPr>
-              <a:t>% clay content</a:t>
-            </a:r>
-            <a:endParaRPr lang="en-US" sz="2400" i="1" dirty="0">
-              <a:solidFill>
-                <a:schemeClr val="tx1"/>
-              </a:solidFill>
-              <a:latin typeface="Arial" panose="020B0604020202020204" pitchFamily="34" charset="0"/>
-              <a:cs typeface="Arial" panose="020B0604020202020204" pitchFamily="34" charset="0"/>
-            </a:endParaRPr>
-          </a:p>
-        </p:txBody>
-      </p:sp>
       <p:cxnSp>
         <p:nvCxnSpPr>
           <p:cNvPr id="129" name="Elbow Connector 128">
@@ -14781,7 +13875,7 @@
               <a:gd name="adj2" fmla="val 99940"/>
             </a:avLst>
           </a:prstGeom>
-          <a:ln w="30734">
+          <a:ln w="30607">
             <a:solidFill>
               <a:schemeClr val="accent1">
                 <a:lumMod val="75000"/>
@@ -14817,16 +13911,20 @@
           </p:cNvPr>
           <p:cNvCxnSpPr>
             <a:cxnSpLocks/>
+            <a:stCxn id="12" idx="2"/>
           </p:cNvCxnSpPr>
           <p:nvPr/>
         </p:nvCxnSpPr>
         <p:spPr>
-          <a:xfrm flipV="1">
-            <a:off x="12907073" y="13691064"/>
-            <a:ext cx="4234088" cy="455414"/>
-          </a:xfrm>
-          <a:prstGeom prst="bentConnector2">
-            <a:avLst/>
+          <a:xfrm rot="5400000" flipH="1" flipV="1">
+            <a:off x="14384474" y="11828403"/>
+            <a:ext cx="894024" cy="4619347"/>
+          </a:xfrm>
+          <a:prstGeom prst="bentConnector4">
+            <a:avLst>
+              <a:gd name="adj1" fmla="val -25570"/>
+              <a:gd name="adj2" fmla="val 99935"/>
+            </a:avLst>
           </a:prstGeom>
           <a:ln w="82550">
             <a:solidFill>
@@ -14877,7 +13975,7 @@
               <a:gd name="adj1" fmla="val 100102"/>
             </a:avLst>
           </a:prstGeom>
-          <a:ln w="156591">
+          <a:ln w="154559">
             <a:solidFill>
               <a:schemeClr val="accent1">
                 <a:lumMod val="75000"/>
@@ -14902,96 +14000,6 @@
           </a:fontRef>
         </p:style>
       </p:cxnSp>
-      <p:sp>
-        <p:nvSpPr>
-          <p:cNvPr id="12" name="Rectangle 11">
-            <a:extLst>
-              <a:ext uri="{FF2B5EF4-FFF2-40B4-BE49-F238E27FC236}">
-                <a16:creationId xmlns:a16="http://schemas.microsoft.com/office/drawing/2014/main" id="{80931944-38F4-9378-6003-83D1DE15C050}"/>
-              </a:ext>
-            </a:extLst>
-          </p:cNvPr>
-          <p:cNvSpPr/>
-          <p:nvPr/>
-        </p:nvSpPr>
-        <p:spPr>
-          <a:xfrm>
-            <a:off x="11612114" y="13707866"/>
-            <a:ext cx="1819398" cy="877223"/>
-          </a:xfrm>
-          <a:prstGeom prst="rect">
-            <a:avLst/>
-          </a:prstGeom>
-          <a:solidFill>
-            <a:schemeClr val="bg1"/>
-          </a:solidFill>
-          <a:ln w="38100">
-            <a:solidFill>
-              <a:schemeClr val="tx1"/>
-            </a:solidFill>
-          </a:ln>
-        </p:spPr>
-        <p:style>
-          <a:lnRef idx="2">
-            <a:schemeClr val="accent1">
-              <a:shade val="50000"/>
-            </a:schemeClr>
-          </a:lnRef>
-          <a:fillRef idx="1">
-            <a:schemeClr val="accent1"/>
-          </a:fillRef>
-          <a:effectRef idx="0">
-            <a:schemeClr val="accent1"/>
-          </a:effectRef>
-          <a:fontRef idx="minor">
-            <a:schemeClr val="lt1"/>
-          </a:fontRef>
-        </p:style>
-        <p:txBody>
-          <a:bodyPr rtlCol="0" anchor="ctr"/>
-          <a:lstStyle/>
-          <a:p>
-            <a:pPr algn="ctr"/>
-            <a:r>
-              <a:rPr lang="en-US" sz="2400" b="1" dirty="0">
-                <a:solidFill>
-                  <a:schemeClr val="tx1"/>
-                </a:solidFill>
-                <a:latin typeface="Arial" panose="020B0604020202020204" pitchFamily="34" charset="0"/>
-                <a:cs typeface="Arial" panose="020B0604020202020204" pitchFamily="34" charset="0"/>
-              </a:rPr>
-              <a:t>C</a:t>
-            </a:r>
-            <a:r>
-              <a:rPr lang="en-US" sz="2400" b="1" baseline="-25000" dirty="0">
-                <a:solidFill>
-                  <a:schemeClr val="tx1"/>
-                </a:solidFill>
-                <a:latin typeface="Arial" panose="020B0604020202020204" pitchFamily="34" charset="0"/>
-                <a:cs typeface="Arial" panose="020B0604020202020204" pitchFamily="34" charset="0"/>
-              </a:rPr>
-              <a:t>3</a:t>
-            </a:r>
-            <a:r>
-              <a:rPr lang="en-US" sz="2400" b="1" dirty="0">
-                <a:solidFill>
-                  <a:schemeClr val="tx1"/>
-                </a:solidFill>
-                <a:latin typeface="Arial" panose="020B0604020202020204" pitchFamily="34" charset="0"/>
-                <a:cs typeface="Arial" panose="020B0604020202020204" pitchFamily="34" charset="0"/>
-              </a:rPr>
-              <a:t> photo.</a:t>
-            </a:r>
-            <a:endParaRPr lang="en-US" sz="2400" b="1" dirty="0">
-              <a:solidFill>
-                <a:srgbClr val="C00000"/>
-              </a:solidFill>
-              <a:latin typeface="Arial" panose="020B0604020202020204" pitchFamily="34" charset="0"/>
-              <a:cs typeface="Arial" panose="020B0604020202020204" pitchFamily="34" charset="0"/>
-            </a:endParaRPr>
-          </a:p>
-        </p:txBody>
-      </p:sp>
       <p:cxnSp>
         <p:nvCxnSpPr>
           <p:cNvPr id="148" name="Elbow Connector 147">
@@ -15016,7 +14024,7 @@
               <a:gd name="adj1" fmla="val 100057"/>
             </a:avLst>
           </a:prstGeom>
-          <a:ln w="14224">
+          <a:ln w="14477">
             <a:solidFill>
               <a:srgbClr val="C00000">
                 <a:alpha val="50000"/>
@@ -15040,76 +14048,6 @@
           </a:fontRef>
         </p:style>
       </p:cxnSp>
-      <p:sp>
-        <p:nvSpPr>
-          <p:cNvPr id="29" name="Rectangle 28">
-            <a:extLst>
-              <a:ext uri="{FF2B5EF4-FFF2-40B4-BE49-F238E27FC236}">
-                <a16:creationId xmlns:a16="http://schemas.microsoft.com/office/drawing/2014/main" id="{32327FC8-D9F4-D197-4681-DC89C3E206D2}"/>
-              </a:ext>
-            </a:extLst>
-          </p:cNvPr>
-          <p:cNvSpPr/>
-          <p:nvPr/>
-        </p:nvSpPr>
-        <p:spPr>
-          <a:xfrm>
-            <a:off x="9249410" y="10711560"/>
-            <a:ext cx="1819398" cy="877223"/>
-          </a:xfrm>
-          <a:prstGeom prst="rect">
-            <a:avLst/>
-          </a:prstGeom>
-          <a:solidFill>
-            <a:schemeClr val="bg1"/>
-          </a:solidFill>
-          <a:ln w="38100">
-            <a:solidFill>
-              <a:schemeClr val="tx1"/>
-            </a:solidFill>
-          </a:ln>
-        </p:spPr>
-        <p:style>
-          <a:lnRef idx="2">
-            <a:schemeClr val="accent1">
-              <a:shade val="50000"/>
-            </a:schemeClr>
-          </a:lnRef>
-          <a:fillRef idx="1">
-            <a:schemeClr val="accent1"/>
-          </a:fillRef>
-          <a:effectRef idx="0">
-            <a:schemeClr val="accent1"/>
-          </a:effectRef>
-          <a:fontRef idx="minor">
-            <a:schemeClr val="lt1"/>
-          </a:fontRef>
-        </p:style>
-        <p:txBody>
-          <a:bodyPr rtlCol="0" anchor="ctr"/>
-          <a:lstStyle/>
-          <a:p>
-            <a:pPr algn="ctr"/>
-            <a:r>
-              <a:rPr lang="en-US" sz="2400" b="1" i="1" dirty="0">
-                <a:solidFill>
-                  <a:schemeClr val="tx1"/>
-                </a:solidFill>
-                <a:latin typeface="Arial" panose="020B0604020202020204" pitchFamily="34" charset="0"/>
-                <a:cs typeface="Arial" panose="020B0604020202020204" pitchFamily="34" charset="0"/>
-              </a:rPr>
-              <a:t>Soil moisture</a:t>
-            </a:r>
-            <a:endParaRPr lang="en-US" sz="2400" b="1" dirty="0">
-              <a:solidFill>
-                <a:schemeClr val="tx1"/>
-              </a:solidFill>
-              <a:latin typeface="Arial" panose="020B0604020202020204" pitchFamily="34" charset="0"/>
-              <a:cs typeface="Arial" panose="020B0604020202020204" pitchFamily="34" charset="0"/>
-            </a:endParaRPr>
-          </a:p>
-        </p:txBody>
-      </p:sp>
       <p:cxnSp>
         <p:nvCxnSpPr>
           <p:cNvPr id="150" name="Straight Arrow Connector 149">
@@ -15273,9 +14211,9 @@
           </a:prstGeom>
           <a:ln w="136906">
             <a:solidFill>
-              <a:schemeClr val="accent1">
+              <a:srgbClr val="C00000">
                 <a:alpha val="50000"/>
-              </a:schemeClr>
+              </a:srgbClr>
             </a:solidFill>
             <a:tailEnd type="triangle"/>
           </a:ln>
@@ -15295,76 +14233,6 @@
           </a:fontRef>
         </p:style>
       </p:cxnSp>
-      <p:sp>
-        <p:nvSpPr>
-          <p:cNvPr id="22" name="Rectangle 21">
-            <a:extLst>
-              <a:ext uri="{FF2B5EF4-FFF2-40B4-BE49-F238E27FC236}">
-                <a16:creationId xmlns:a16="http://schemas.microsoft.com/office/drawing/2014/main" id="{A80C041E-0131-071A-4799-F8F798234F95}"/>
-              </a:ext>
-            </a:extLst>
-          </p:cNvPr>
-          <p:cNvSpPr/>
-          <p:nvPr/>
-        </p:nvSpPr>
-        <p:spPr>
-          <a:xfrm>
-            <a:off x="13842977" y="9774814"/>
-            <a:ext cx="1819398" cy="877223"/>
-          </a:xfrm>
-          <a:prstGeom prst="rect">
-            <a:avLst/>
-          </a:prstGeom>
-          <a:solidFill>
-            <a:schemeClr val="bg1"/>
-          </a:solidFill>
-          <a:ln w="38100">
-            <a:solidFill>
-              <a:schemeClr val="tx1"/>
-            </a:solidFill>
-          </a:ln>
-        </p:spPr>
-        <p:style>
-          <a:lnRef idx="2">
-            <a:schemeClr val="accent1">
-              <a:shade val="50000"/>
-            </a:schemeClr>
-          </a:lnRef>
-          <a:fillRef idx="1">
-            <a:schemeClr val="accent1"/>
-          </a:fillRef>
-          <a:effectRef idx="0">
-            <a:schemeClr val="accent1"/>
-          </a:effectRef>
-          <a:fontRef idx="minor">
-            <a:schemeClr val="lt1"/>
-          </a:fontRef>
-        </p:style>
-        <p:txBody>
-          <a:bodyPr rtlCol="0" anchor="ctr"/>
-          <a:lstStyle/>
-          <a:p>
-            <a:pPr algn="ctr"/>
-            <a:r>
-              <a:rPr lang="en-US" sz="2400" b="1" i="1" dirty="0">
-                <a:solidFill>
-                  <a:schemeClr val="tx1"/>
-                </a:solidFill>
-                <a:latin typeface="Arial" panose="020B0604020202020204" pitchFamily="34" charset="0"/>
-                <a:cs typeface="Arial" panose="020B0604020202020204" pitchFamily="34" charset="0"/>
-              </a:rPr>
-              <a:t>VPD</a:t>
-            </a:r>
-            <a:endParaRPr lang="en-US" sz="2400" b="1" dirty="0">
-              <a:solidFill>
-                <a:schemeClr val="tx1"/>
-              </a:solidFill>
-              <a:latin typeface="Arial" panose="020B0604020202020204" pitchFamily="34" charset="0"/>
-              <a:cs typeface="Arial" panose="020B0604020202020204" pitchFamily="34" charset="0"/>
-            </a:endParaRPr>
-          </a:p>
-        </p:txBody>
-      </p:sp>
       <p:grpSp>
         <p:nvGrpSpPr>
           <p:cNvPr id="2" name="Group 1">
@@ -15380,9 +14248,9 @@
         <p:grpSpPr>
           <a:xfrm>
             <a:off x="10456775" y="15278054"/>
-            <a:ext cx="7208824" cy="1604907"/>
+            <a:ext cx="7208824" cy="1332351"/>
             <a:chOff x="9836749" y="13266385"/>
-            <a:chExt cx="7208824" cy="1604907"/>
+            <a:chExt cx="7208824" cy="1332351"/>
           </a:xfrm>
         </p:grpSpPr>
         <p:cxnSp>
@@ -15803,7 +14671,7 @@
           </p:nvSpPr>
           <p:spPr>
             <a:xfrm>
-              <a:off x="11262239" y="14317294"/>
+              <a:off x="11276323" y="14044738"/>
               <a:ext cx="4278735" cy="553998"/>
             </a:xfrm>
             <a:prstGeom prst="rect">
@@ -16588,6 +15456,36 @@
           <a:p>
             <a:pPr algn="ctr"/>
             <a:r>
+              <a:rPr lang="en-US" sz="2400" b="1" i="1" dirty="0">
+                <a:solidFill>
+                  <a:schemeClr val="tx1"/>
+                </a:solidFill>
+                <a:latin typeface="Arial" panose="020B0604020202020204" pitchFamily="34" charset="0"/>
+                <a:cs typeface="Arial" panose="020B0604020202020204" pitchFamily="34" charset="0"/>
+              </a:rPr>
+              <a:t>C</a:t>
+            </a:r>
+            <a:r>
+              <a:rPr lang="en-US" sz="2400" b="1" i="1" baseline="-25000" dirty="0">
+                <a:solidFill>
+                  <a:schemeClr val="tx1"/>
+                </a:solidFill>
+                <a:latin typeface="Arial" panose="020B0604020202020204" pitchFamily="34" charset="0"/>
+                <a:cs typeface="Arial" panose="020B0604020202020204" pitchFamily="34" charset="0"/>
+              </a:rPr>
+              <a:t>3</a:t>
+            </a:r>
+            <a:r>
+              <a:rPr lang="en-US" sz="2400" b="1" i="1" dirty="0">
+                <a:solidFill>
+                  <a:schemeClr val="tx1"/>
+                </a:solidFill>
+                <a:latin typeface="Arial" panose="020B0604020202020204" pitchFamily="34" charset="0"/>
+                <a:cs typeface="Arial" panose="020B0604020202020204" pitchFamily="34" charset="0"/>
+              </a:rPr>
+              <a:t> photo</a:t>
+            </a:r>
+            <a:r>
               <a:rPr lang="en-US" sz="2400" b="1" dirty="0">
                 <a:solidFill>
                   <a:schemeClr val="tx1"/>
@@ -16595,27 +15493,7 @@
                 <a:latin typeface="Arial" panose="020B0604020202020204" pitchFamily="34" charset="0"/>
                 <a:cs typeface="Arial" panose="020B0604020202020204" pitchFamily="34" charset="0"/>
               </a:rPr>
-              <a:t>C</a:t>
-            </a:r>
-            <a:r>
-              <a:rPr lang="en-US" sz="2400" b="1" baseline="-25000" dirty="0">
-                <a:solidFill>
-                  <a:schemeClr val="tx1"/>
-                </a:solidFill>
-                <a:latin typeface="Arial" panose="020B0604020202020204" pitchFamily="34" charset="0"/>
-                <a:cs typeface="Arial" panose="020B0604020202020204" pitchFamily="34" charset="0"/>
-              </a:rPr>
-              <a:t>3</a:t>
-            </a:r>
-            <a:r>
-              <a:rPr lang="en-US" sz="2400" b="1" dirty="0">
-                <a:solidFill>
-                  <a:schemeClr val="tx1"/>
-                </a:solidFill>
-                <a:latin typeface="Arial" panose="020B0604020202020204" pitchFamily="34" charset="0"/>
-                <a:cs typeface="Arial" panose="020B0604020202020204" pitchFamily="34" charset="0"/>
-              </a:rPr>
-              <a:t> photo.</a:t>
+              <a:t>.</a:t>
             </a:r>
             <a:endParaRPr lang="en-US" sz="2400" b="1" dirty="0">
               <a:solidFill>
@@ -17882,7 +16760,7 @@
               <a:gd name="adj1" fmla="val 59503"/>
             </a:avLst>
           </a:prstGeom>
-          <a:ln w="7238">
+          <a:ln w="7112">
             <a:solidFill>
               <a:schemeClr val="bg1">
                 <a:lumMod val="65000"/>
@@ -17929,7 +16807,7 @@
           <a:prstGeom prst="straightConnector1">
             <a:avLst/>
           </a:prstGeom>
-          <a:ln w="7238">
+          <a:ln w="7112">
             <a:solidFill>
               <a:schemeClr val="bg1">
                 <a:lumMod val="65000"/>
@@ -17955,6 +16833,1481 @@
           </a:fontRef>
         </p:style>
       </p:cxnSp>
+      <p:grpSp>
+        <p:nvGrpSpPr>
+          <p:cNvPr id="30" name="Group 29">
+            <a:extLst>
+              <a:ext uri="{FF2B5EF4-FFF2-40B4-BE49-F238E27FC236}">
+                <a16:creationId xmlns:a16="http://schemas.microsoft.com/office/drawing/2014/main" id="{93C33AF3-CBA8-7C36-3976-1D7F61EA9A8E}"/>
+              </a:ext>
+            </a:extLst>
+          </p:cNvPr>
+          <p:cNvGrpSpPr/>
+          <p:nvPr/>
+        </p:nvGrpSpPr>
+        <p:grpSpPr>
+          <a:xfrm>
+            <a:off x="14248407" y="7053509"/>
+            <a:ext cx="2561532" cy="853440"/>
+            <a:chOff x="14336889" y="10167639"/>
+            <a:chExt cx="2561532" cy="853440"/>
+          </a:xfrm>
+        </p:grpSpPr>
+        <p:cxnSp>
+          <p:nvCxnSpPr>
+            <p:cNvPr id="128" name="Straight Arrow Connector 127">
+              <a:extLst>
+                <a:ext uri="{FF2B5EF4-FFF2-40B4-BE49-F238E27FC236}">
+                  <a16:creationId xmlns:a16="http://schemas.microsoft.com/office/drawing/2014/main" id="{5BC5ECCF-1D36-3A07-3254-880CF2C608FB}"/>
+                </a:ext>
+              </a:extLst>
+            </p:cNvPr>
+            <p:cNvCxnSpPr/>
+            <p:nvPr/>
+          </p:nvCxnSpPr>
+          <p:spPr>
+            <a:xfrm>
+              <a:off x="14498320" y="10441446"/>
+              <a:ext cx="680720" cy="0"/>
+            </a:xfrm>
+            <a:prstGeom prst="straightConnector1">
+              <a:avLst/>
+            </a:prstGeom>
+            <a:ln w="76200">
+              <a:solidFill>
+                <a:schemeClr val="accent1">
+                  <a:lumMod val="75000"/>
+                </a:schemeClr>
+              </a:solidFill>
+              <a:tailEnd type="triangle"/>
+            </a:ln>
+          </p:spPr>
+          <p:style>
+            <a:lnRef idx="1">
+              <a:schemeClr val="accent1"/>
+            </a:lnRef>
+            <a:fillRef idx="0">
+              <a:schemeClr val="accent1"/>
+            </a:fillRef>
+            <a:effectRef idx="0">
+              <a:schemeClr val="accent1"/>
+            </a:effectRef>
+            <a:fontRef idx="minor">
+              <a:schemeClr val="tx1"/>
+            </a:fontRef>
+          </p:style>
+        </p:cxnSp>
+        <p:sp>
+          <p:nvSpPr>
+            <p:cNvPr id="130" name="TextBox 129">
+              <a:extLst>
+                <a:ext uri="{FF2B5EF4-FFF2-40B4-BE49-F238E27FC236}">
+                  <a16:creationId xmlns:a16="http://schemas.microsoft.com/office/drawing/2014/main" id="{31C83831-0446-0835-8397-8EFDF52FC991}"/>
+                </a:ext>
+              </a:extLst>
+            </p:cNvPr>
+            <p:cNvSpPr txBox="1"/>
+            <p:nvPr/>
+          </p:nvSpPr>
+          <p:spPr>
+            <a:xfrm>
+              <a:off x="15179040" y="10256780"/>
+              <a:ext cx="1616789" cy="369332"/>
+            </a:xfrm>
+            <a:prstGeom prst="rect">
+              <a:avLst/>
+            </a:prstGeom>
+            <a:noFill/>
+          </p:spPr>
+          <p:txBody>
+            <a:bodyPr wrap="none" rtlCol="0">
+              <a:spAutoFit/>
+            </a:bodyPr>
+            <a:lstStyle/>
+            <a:p>
+              <a:r>
+                <a:rPr lang="en-US" dirty="0">
+                  <a:latin typeface="Arial" panose="020B0604020202020204" pitchFamily="34" charset="0"/>
+                  <a:cs typeface="Arial" panose="020B0604020202020204" pitchFamily="34" charset="0"/>
+                </a:rPr>
+                <a:t>Positive effect</a:t>
+              </a:r>
+            </a:p>
+          </p:txBody>
+        </p:sp>
+        <p:cxnSp>
+          <p:nvCxnSpPr>
+            <p:cNvPr id="131" name="Straight Arrow Connector 130">
+              <a:extLst>
+                <a:ext uri="{FF2B5EF4-FFF2-40B4-BE49-F238E27FC236}">
+                  <a16:creationId xmlns:a16="http://schemas.microsoft.com/office/drawing/2014/main" id="{68C4E9B3-A6D4-4357-6E1A-B9C2F9852D42}"/>
+                </a:ext>
+              </a:extLst>
+            </p:cNvPr>
+            <p:cNvCxnSpPr/>
+            <p:nvPr/>
+          </p:nvCxnSpPr>
+          <p:spPr>
+            <a:xfrm>
+              <a:off x="14498320" y="10729878"/>
+              <a:ext cx="680720" cy="0"/>
+            </a:xfrm>
+            <a:prstGeom prst="straightConnector1">
+              <a:avLst/>
+            </a:prstGeom>
+            <a:ln w="76200">
+              <a:solidFill>
+                <a:srgbClr val="C00000"/>
+              </a:solidFill>
+              <a:tailEnd type="triangle"/>
+            </a:ln>
+          </p:spPr>
+          <p:style>
+            <a:lnRef idx="1">
+              <a:schemeClr val="accent1"/>
+            </a:lnRef>
+            <a:fillRef idx="0">
+              <a:schemeClr val="accent1"/>
+            </a:fillRef>
+            <a:effectRef idx="0">
+              <a:schemeClr val="accent1"/>
+            </a:effectRef>
+            <a:fontRef idx="minor">
+              <a:schemeClr val="tx1"/>
+            </a:fontRef>
+          </p:style>
+        </p:cxnSp>
+        <p:sp>
+          <p:nvSpPr>
+            <p:cNvPr id="132" name="TextBox 131">
+              <a:extLst>
+                <a:ext uri="{FF2B5EF4-FFF2-40B4-BE49-F238E27FC236}">
+                  <a16:creationId xmlns:a16="http://schemas.microsoft.com/office/drawing/2014/main" id="{88580F84-16DB-9D98-C76F-354460E28EA1}"/>
+                </a:ext>
+              </a:extLst>
+            </p:cNvPr>
+            <p:cNvSpPr txBox="1"/>
+            <p:nvPr/>
+          </p:nvSpPr>
+          <p:spPr>
+            <a:xfrm>
+              <a:off x="15179040" y="10545212"/>
+              <a:ext cx="1719381" cy="369332"/>
+            </a:xfrm>
+            <a:prstGeom prst="rect">
+              <a:avLst/>
+            </a:prstGeom>
+            <a:noFill/>
+          </p:spPr>
+          <p:txBody>
+            <a:bodyPr wrap="none" rtlCol="0">
+              <a:spAutoFit/>
+            </a:bodyPr>
+            <a:lstStyle/>
+            <a:p>
+              <a:r>
+                <a:rPr lang="en-US" dirty="0">
+                  <a:latin typeface="Arial" panose="020B0604020202020204" pitchFamily="34" charset="0"/>
+                  <a:cs typeface="Arial" panose="020B0604020202020204" pitchFamily="34" charset="0"/>
+                </a:rPr>
+                <a:t>Negative effect</a:t>
+              </a:r>
+            </a:p>
+          </p:txBody>
+        </p:sp>
+        <p:sp>
+          <p:nvSpPr>
+            <p:cNvPr id="133" name="Rectangle 132">
+              <a:extLst>
+                <a:ext uri="{FF2B5EF4-FFF2-40B4-BE49-F238E27FC236}">
+                  <a16:creationId xmlns:a16="http://schemas.microsoft.com/office/drawing/2014/main" id="{EF25A1EB-5BC4-E0B7-1C89-07CAA4C653A3}"/>
+                </a:ext>
+              </a:extLst>
+            </p:cNvPr>
+            <p:cNvSpPr/>
+            <p:nvPr/>
+          </p:nvSpPr>
+          <p:spPr>
+            <a:xfrm>
+              <a:off x="14336889" y="10167639"/>
+              <a:ext cx="2561532" cy="853440"/>
+            </a:xfrm>
+            <a:prstGeom prst="rect">
+              <a:avLst/>
+            </a:prstGeom>
+            <a:noFill/>
+            <a:ln w="38100">
+              <a:solidFill>
+                <a:schemeClr val="tx1"/>
+              </a:solidFill>
+            </a:ln>
+          </p:spPr>
+          <p:style>
+            <a:lnRef idx="2">
+              <a:schemeClr val="accent1">
+                <a:shade val="15000"/>
+              </a:schemeClr>
+            </a:lnRef>
+            <a:fillRef idx="1">
+              <a:schemeClr val="accent1"/>
+            </a:fillRef>
+            <a:effectRef idx="0">
+              <a:schemeClr val="accent1"/>
+            </a:effectRef>
+            <a:fontRef idx="minor">
+              <a:schemeClr val="lt1"/>
+            </a:fontRef>
+          </p:style>
+          <p:txBody>
+            <a:bodyPr rtlCol="0" anchor="ctr"/>
+            <a:lstStyle/>
+            <a:p>
+              <a:pPr algn="ctr"/>
+              <a:endParaRPr lang="en-US"/>
+            </a:p>
+          </p:txBody>
+        </p:sp>
+      </p:grpSp>
+      <p:cxnSp>
+        <p:nvCxnSpPr>
+          <p:cNvPr id="31" name="Elbow Connector 30">
+            <a:extLst>
+              <a:ext uri="{FF2B5EF4-FFF2-40B4-BE49-F238E27FC236}">
+                <a16:creationId xmlns:a16="http://schemas.microsoft.com/office/drawing/2014/main" id="{C7EFE26F-7F6A-1C58-17DB-D9A4DE6DA6A4}"/>
+              </a:ext>
+            </a:extLst>
+          </p:cNvPr>
+          <p:cNvCxnSpPr>
+            <a:cxnSpLocks/>
+          </p:cNvCxnSpPr>
+          <p:nvPr/>
+        </p:nvCxnSpPr>
+        <p:spPr>
+          <a:xfrm rot="16200000" flipH="1">
+            <a:off x="10588195" y="10919370"/>
+            <a:ext cx="601182" cy="1459355"/>
+          </a:xfrm>
+          <a:prstGeom prst="bentConnector2">
+            <a:avLst/>
+          </a:prstGeom>
+          <a:ln w="20574">
+            <a:solidFill>
+              <a:schemeClr val="accent1">
+                <a:lumMod val="75000"/>
+              </a:schemeClr>
+            </a:solidFill>
+            <a:tailEnd type="triangle"/>
+          </a:ln>
+        </p:spPr>
+        <p:style>
+          <a:lnRef idx="1">
+            <a:schemeClr val="accent1"/>
+          </a:lnRef>
+          <a:fillRef idx="0">
+            <a:schemeClr val="accent1"/>
+          </a:fillRef>
+          <a:effectRef idx="0">
+            <a:schemeClr val="accent1"/>
+          </a:effectRef>
+          <a:fontRef idx="minor">
+            <a:schemeClr val="tx1"/>
+          </a:fontRef>
+        </p:style>
+      </p:cxnSp>
+      <p:cxnSp>
+        <p:nvCxnSpPr>
+          <p:cNvPr id="43" name="Straight Arrow Connector 42">
+            <a:extLst>
+              <a:ext uri="{FF2B5EF4-FFF2-40B4-BE49-F238E27FC236}">
+                <a16:creationId xmlns:a16="http://schemas.microsoft.com/office/drawing/2014/main" id="{6C8D84F6-E7F2-457E-C6CE-71B0F87335B1}"/>
+              </a:ext>
+            </a:extLst>
+          </p:cNvPr>
+          <p:cNvCxnSpPr>
+            <a:cxnSpLocks/>
+          </p:cNvCxnSpPr>
+          <p:nvPr/>
+        </p:nvCxnSpPr>
+        <p:spPr>
+          <a:xfrm>
+            <a:off x="13437862" y="12179286"/>
+            <a:ext cx="892510" cy="0"/>
+          </a:xfrm>
+          <a:prstGeom prst="straightConnector1">
+            <a:avLst/>
+          </a:prstGeom>
+          <a:ln w="68199">
+            <a:solidFill>
+              <a:schemeClr val="accent1">
+                <a:lumMod val="75000"/>
+              </a:schemeClr>
+            </a:solidFill>
+            <a:tailEnd type="triangle"/>
+          </a:ln>
+        </p:spPr>
+        <p:style>
+          <a:lnRef idx="1">
+            <a:schemeClr val="accent1"/>
+          </a:lnRef>
+          <a:fillRef idx="0">
+            <a:schemeClr val="accent1"/>
+          </a:fillRef>
+          <a:effectRef idx="0">
+            <a:schemeClr val="accent1"/>
+          </a:effectRef>
+          <a:fontRef idx="minor">
+            <a:schemeClr val="tx1"/>
+          </a:fontRef>
+        </p:style>
+      </p:cxnSp>
+      <p:cxnSp>
+        <p:nvCxnSpPr>
+          <p:cNvPr id="45" name="Straight Arrow Connector 44">
+            <a:extLst>
+              <a:ext uri="{FF2B5EF4-FFF2-40B4-BE49-F238E27FC236}">
+                <a16:creationId xmlns:a16="http://schemas.microsoft.com/office/drawing/2014/main" id="{6071B235-6C4D-6C35-571A-EA3AE9A92167}"/>
+              </a:ext>
+            </a:extLst>
+          </p:cNvPr>
+          <p:cNvCxnSpPr>
+            <a:cxnSpLocks/>
+          </p:cNvCxnSpPr>
+          <p:nvPr/>
+        </p:nvCxnSpPr>
+        <p:spPr>
+          <a:xfrm>
+            <a:off x="14752676" y="10642604"/>
+            <a:ext cx="0" cy="1098071"/>
+          </a:xfrm>
+          <a:prstGeom prst="straightConnector1">
+            <a:avLst/>
+          </a:prstGeom>
+          <a:ln w="19939">
+            <a:solidFill>
+              <a:srgbClr val="C00000"/>
+            </a:solidFill>
+            <a:tailEnd type="triangle"/>
+          </a:ln>
+        </p:spPr>
+        <p:style>
+          <a:lnRef idx="1">
+            <a:schemeClr val="accent1"/>
+          </a:lnRef>
+          <a:fillRef idx="0">
+            <a:schemeClr val="accent1"/>
+          </a:fillRef>
+          <a:effectRef idx="0">
+            <a:schemeClr val="accent1"/>
+          </a:effectRef>
+          <a:fontRef idx="minor">
+            <a:schemeClr val="tx1"/>
+          </a:fontRef>
+        </p:style>
+      </p:cxnSp>
+      <p:cxnSp>
+        <p:nvCxnSpPr>
+          <p:cNvPr id="50" name="Elbow Connector 49">
+            <a:extLst>
+              <a:ext uri="{FF2B5EF4-FFF2-40B4-BE49-F238E27FC236}">
+                <a16:creationId xmlns:a16="http://schemas.microsoft.com/office/drawing/2014/main" id="{1A91E203-0108-68AF-3E35-4118D6B6B8BA}"/>
+              </a:ext>
+            </a:extLst>
+          </p:cNvPr>
+          <p:cNvCxnSpPr>
+            <a:stCxn id="24" idx="0"/>
+            <a:endCxn id="20" idx="1"/>
+          </p:cNvCxnSpPr>
+          <p:nvPr/>
+        </p:nvCxnSpPr>
+        <p:spPr>
+          <a:xfrm rot="5400000" flipH="1" flipV="1">
+            <a:off x="15708645" y="10693420"/>
+            <a:ext cx="589520" cy="1504991"/>
+          </a:xfrm>
+          <a:prstGeom prst="bentConnector2">
+            <a:avLst/>
+          </a:prstGeom>
+          <a:ln w="39624">
+            <a:solidFill>
+              <a:schemeClr val="bg1">
+                <a:lumMod val="75000"/>
+              </a:schemeClr>
+            </a:solidFill>
+            <a:prstDash val="sysDash"/>
+            <a:tailEnd type="triangle"/>
+          </a:ln>
+        </p:spPr>
+        <p:style>
+          <a:lnRef idx="1">
+            <a:schemeClr val="accent1"/>
+          </a:lnRef>
+          <a:fillRef idx="0">
+            <a:schemeClr val="accent1"/>
+          </a:fillRef>
+          <a:effectRef idx="0">
+            <a:schemeClr val="accent1"/>
+          </a:effectRef>
+          <a:fontRef idx="minor">
+            <a:schemeClr val="tx1"/>
+          </a:fontRef>
+        </p:style>
+      </p:cxnSp>
+      <p:cxnSp>
+        <p:nvCxnSpPr>
+          <p:cNvPr id="51" name="Elbow Connector 50">
+            <a:extLst>
+              <a:ext uri="{FF2B5EF4-FFF2-40B4-BE49-F238E27FC236}">
+                <a16:creationId xmlns:a16="http://schemas.microsoft.com/office/drawing/2014/main" id="{4B9A6050-891E-DD21-BF59-4A2C98309D21}"/>
+              </a:ext>
+            </a:extLst>
+          </p:cNvPr>
+          <p:cNvCxnSpPr>
+            <a:cxnSpLocks/>
+            <a:stCxn id="24" idx="2"/>
+            <a:endCxn id="17" idx="1"/>
+          </p:cNvCxnSpPr>
+          <p:nvPr/>
+        </p:nvCxnSpPr>
+        <p:spPr>
+          <a:xfrm rot="16200000" flipH="1">
+            <a:off x="15686128" y="12182679"/>
+            <a:ext cx="634555" cy="1504991"/>
+          </a:xfrm>
+          <a:prstGeom prst="bentConnector2">
+            <a:avLst/>
+          </a:prstGeom>
+          <a:ln w="63119">
+            <a:solidFill>
+              <a:srgbClr val="C00000"/>
+            </a:solidFill>
+            <a:tailEnd type="triangle"/>
+          </a:ln>
+        </p:spPr>
+        <p:style>
+          <a:lnRef idx="1">
+            <a:schemeClr val="accent1"/>
+          </a:lnRef>
+          <a:fillRef idx="0">
+            <a:schemeClr val="accent1"/>
+          </a:fillRef>
+          <a:effectRef idx="0">
+            <a:schemeClr val="accent1"/>
+          </a:effectRef>
+          <a:fontRef idx="minor">
+            <a:schemeClr val="tx1"/>
+          </a:fontRef>
+        </p:style>
+      </p:cxnSp>
+      <p:cxnSp>
+        <p:nvCxnSpPr>
+          <p:cNvPr id="57" name="Elbow Connector 56">
+            <a:extLst>
+              <a:ext uri="{FF2B5EF4-FFF2-40B4-BE49-F238E27FC236}">
+                <a16:creationId xmlns:a16="http://schemas.microsoft.com/office/drawing/2014/main" id="{C692133E-2952-0ECD-87D3-B8F051B6F346}"/>
+              </a:ext>
+            </a:extLst>
+          </p:cNvPr>
+          <p:cNvCxnSpPr>
+            <a:cxnSpLocks/>
+            <a:stCxn id="20" idx="0"/>
+            <a:endCxn id="11" idx="0"/>
+          </p:cNvCxnSpPr>
+          <p:nvPr/>
+        </p:nvCxnSpPr>
+        <p:spPr>
+          <a:xfrm rot="16200000" flipH="1">
+            <a:off x="18273408" y="10104734"/>
+            <a:ext cx="1061295" cy="2276912"/>
+          </a:xfrm>
+          <a:prstGeom prst="bentConnector3">
+            <a:avLst>
+              <a:gd name="adj1" fmla="val -21540"/>
+            </a:avLst>
+          </a:prstGeom>
+          <a:ln w="187198">
+            <a:solidFill>
+              <a:schemeClr val="accent1">
+                <a:lumMod val="75000"/>
+              </a:schemeClr>
+            </a:solidFill>
+            <a:tailEnd type="triangle"/>
+          </a:ln>
+        </p:spPr>
+        <p:style>
+          <a:lnRef idx="1">
+            <a:schemeClr val="accent1"/>
+          </a:lnRef>
+          <a:fillRef idx="0">
+            <a:schemeClr val="accent1"/>
+          </a:fillRef>
+          <a:effectRef idx="0">
+            <a:schemeClr val="accent1"/>
+          </a:effectRef>
+          <a:fontRef idx="minor">
+            <a:schemeClr val="tx1"/>
+          </a:fontRef>
+        </p:style>
+      </p:cxnSp>
+      <p:cxnSp>
+        <p:nvCxnSpPr>
+          <p:cNvPr id="58" name="Elbow Connector 57">
+            <a:extLst>
+              <a:ext uri="{FF2B5EF4-FFF2-40B4-BE49-F238E27FC236}">
+                <a16:creationId xmlns:a16="http://schemas.microsoft.com/office/drawing/2014/main" id="{2A6C5F73-DA31-2131-4A22-7E2D5FC27865}"/>
+              </a:ext>
+            </a:extLst>
+          </p:cNvPr>
+          <p:cNvCxnSpPr>
+            <a:cxnSpLocks/>
+            <a:stCxn id="17" idx="2"/>
+            <a:endCxn id="11" idx="2"/>
+          </p:cNvCxnSpPr>
+          <p:nvPr/>
+        </p:nvCxnSpPr>
+        <p:spPr>
+          <a:xfrm rot="5400000" flipH="1" flipV="1">
+            <a:off x="18284054" y="12032607"/>
+            <a:ext cx="1040003" cy="2276912"/>
+          </a:xfrm>
+          <a:prstGeom prst="bentConnector3">
+            <a:avLst>
+              <a:gd name="adj1" fmla="val -21981"/>
+            </a:avLst>
+          </a:prstGeom>
+          <a:ln w="164719">
+            <a:solidFill>
+              <a:schemeClr val="accent1">
+                <a:lumMod val="75000"/>
+              </a:schemeClr>
+            </a:solidFill>
+            <a:tailEnd type="triangle"/>
+          </a:ln>
+        </p:spPr>
+        <p:style>
+          <a:lnRef idx="1">
+            <a:schemeClr val="accent1"/>
+          </a:lnRef>
+          <a:fillRef idx="0">
+            <a:schemeClr val="accent1"/>
+          </a:fillRef>
+          <a:effectRef idx="0">
+            <a:schemeClr val="accent1"/>
+          </a:effectRef>
+          <a:fontRef idx="minor">
+            <a:schemeClr val="tx1"/>
+          </a:fontRef>
+        </p:style>
+      </p:cxnSp>
+      <p:cxnSp>
+        <p:nvCxnSpPr>
+          <p:cNvPr id="160" name="Straight Arrow Connector 159">
+            <a:extLst>
+              <a:ext uri="{FF2B5EF4-FFF2-40B4-BE49-F238E27FC236}">
+                <a16:creationId xmlns:a16="http://schemas.microsoft.com/office/drawing/2014/main" id="{B7BC32FF-CA01-6112-27E7-E36B0ED38566}"/>
+              </a:ext>
+            </a:extLst>
+          </p:cNvPr>
+          <p:cNvCxnSpPr>
+            <a:stCxn id="12" idx="0"/>
+            <a:endCxn id="23" idx="2"/>
+          </p:cNvCxnSpPr>
+          <p:nvPr/>
+        </p:nvCxnSpPr>
+        <p:spPr>
+          <a:xfrm flipV="1">
+            <a:off x="12521813" y="12628576"/>
+            <a:ext cx="6350" cy="1079290"/>
+          </a:xfrm>
+          <a:prstGeom prst="straightConnector1">
+            <a:avLst/>
+          </a:prstGeom>
+          <a:ln w="174752">
+            <a:solidFill>
+              <a:schemeClr val="accent1">
+                <a:lumMod val="75000"/>
+              </a:schemeClr>
+            </a:solidFill>
+            <a:tailEnd type="triangle"/>
+          </a:ln>
+        </p:spPr>
+        <p:style>
+          <a:lnRef idx="1">
+            <a:schemeClr val="accent1"/>
+          </a:lnRef>
+          <a:fillRef idx="0">
+            <a:schemeClr val="accent1"/>
+          </a:fillRef>
+          <a:effectRef idx="0">
+            <a:schemeClr val="accent1"/>
+          </a:effectRef>
+          <a:fontRef idx="minor">
+            <a:schemeClr val="tx1"/>
+          </a:fontRef>
+        </p:style>
+      </p:cxnSp>
+      <p:sp>
+        <p:nvSpPr>
+          <p:cNvPr id="23" name="Rectangle 22">
+            <a:extLst>
+              <a:ext uri="{FF2B5EF4-FFF2-40B4-BE49-F238E27FC236}">
+                <a16:creationId xmlns:a16="http://schemas.microsoft.com/office/drawing/2014/main" id="{C3510981-FE55-509B-F5B4-9D8C4012346D}"/>
+              </a:ext>
+            </a:extLst>
+          </p:cNvPr>
+          <p:cNvSpPr/>
+          <p:nvPr/>
+        </p:nvSpPr>
+        <p:spPr>
+          <a:xfrm>
+            <a:off x="11618464" y="11751353"/>
+            <a:ext cx="1819398" cy="877223"/>
+          </a:xfrm>
+          <a:prstGeom prst="rect">
+            <a:avLst/>
+          </a:prstGeom>
+          <a:solidFill>
+            <a:schemeClr val="bg1"/>
+          </a:solidFill>
+          <a:ln w="38100">
+            <a:solidFill>
+              <a:schemeClr val="tx1"/>
+            </a:solidFill>
+          </a:ln>
+        </p:spPr>
+        <p:style>
+          <a:lnRef idx="2">
+            <a:schemeClr val="accent1">
+              <a:shade val="50000"/>
+            </a:schemeClr>
+          </a:lnRef>
+          <a:fillRef idx="1">
+            <a:schemeClr val="accent1"/>
+          </a:fillRef>
+          <a:effectRef idx="0">
+            <a:schemeClr val="accent1"/>
+          </a:effectRef>
+          <a:fontRef idx="minor">
+            <a:schemeClr val="lt1"/>
+          </a:fontRef>
+        </p:style>
+        <p:txBody>
+          <a:bodyPr rtlCol="0" anchor="ctr"/>
+          <a:lstStyle/>
+          <a:p>
+            <a:pPr algn="ctr"/>
+            <a:r>
+              <a:rPr lang="el-GR" sz="2400" b="1" i="1" dirty="0">
+                <a:solidFill>
+                  <a:schemeClr val="tx1"/>
+                </a:solidFill>
+                <a:latin typeface="Arial" panose="020B0604020202020204" pitchFamily="34" charset="0"/>
+                <a:cs typeface="Arial" panose="020B0604020202020204" pitchFamily="34" charset="0"/>
+              </a:rPr>
+              <a:t>β</a:t>
+            </a:r>
+            <a:endParaRPr lang="en-US" sz="2400" b="1" i="1" dirty="0">
+              <a:solidFill>
+                <a:schemeClr val="tx1"/>
+              </a:solidFill>
+              <a:latin typeface="Arial" panose="020B0604020202020204" pitchFamily="34" charset="0"/>
+              <a:cs typeface="Arial" panose="020B0604020202020204" pitchFamily="34" charset="0"/>
+            </a:endParaRPr>
+          </a:p>
+        </p:txBody>
+      </p:sp>
+      <p:sp>
+        <p:nvSpPr>
+          <p:cNvPr id="28" name="Rectangle 27">
+            <a:extLst>
+              <a:ext uri="{FF2B5EF4-FFF2-40B4-BE49-F238E27FC236}">
+                <a16:creationId xmlns:a16="http://schemas.microsoft.com/office/drawing/2014/main" id="{F9845BF1-920A-DFA4-A428-9653A04CD2C8}"/>
+              </a:ext>
+            </a:extLst>
+          </p:cNvPr>
+          <p:cNvSpPr/>
+          <p:nvPr/>
+        </p:nvSpPr>
+        <p:spPr>
+          <a:xfrm>
+            <a:off x="11618464" y="9774814"/>
+            <a:ext cx="1819398" cy="877223"/>
+          </a:xfrm>
+          <a:prstGeom prst="rect">
+            <a:avLst/>
+          </a:prstGeom>
+          <a:solidFill>
+            <a:schemeClr val="bg1"/>
+          </a:solidFill>
+          <a:ln w="38100">
+            <a:solidFill>
+              <a:schemeClr val="tx1"/>
+            </a:solidFill>
+          </a:ln>
+        </p:spPr>
+        <p:style>
+          <a:lnRef idx="2">
+            <a:schemeClr val="accent1">
+              <a:shade val="50000"/>
+            </a:schemeClr>
+          </a:lnRef>
+          <a:fillRef idx="1">
+            <a:schemeClr val="accent1"/>
+          </a:fillRef>
+          <a:effectRef idx="0">
+            <a:schemeClr val="accent1"/>
+          </a:effectRef>
+          <a:fontRef idx="minor">
+            <a:schemeClr val="lt1"/>
+          </a:fontRef>
+        </p:style>
+        <p:txBody>
+          <a:bodyPr rtlCol="0" anchor="ctr"/>
+          <a:lstStyle/>
+          <a:p>
+            <a:pPr algn="ctr"/>
+            <a:r>
+              <a:rPr lang="en-US" sz="2400" b="1" i="1" dirty="0">
+                <a:solidFill>
+                  <a:schemeClr val="tx1"/>
+                </a:solidFill>
+                <a:latin typeface="Arial" panose="020B0604020202020204" pitchFamily="34" charset="0"/>
+                <a:cs typeface="Arial" panose="020B0604020202020204" pitchFamily="34" charset="0"/>
+              </a:rPr>
+              <a:t>N</a:t>
+            </a:r>
+            <a:r>
+              <a:rPr lang="en-US" sz="2400" b="1" baseline="-25000" dirty="0">
+                <a:solidFill>
+                  <a:schemeClr val="tx1"/>
+                </a:solidFill>
+                <a:latin typeface="Arial" panose="020B0604020202020204" pitchFamily="34" charset="0"/>
+                <a:cs typeface="Arial" panose="020B0604020202020204" pitchFamily="34" charset="0"/>
+              </a:rPr>
+              <a:t>fixation</a:t>
+            </a:r>
+            <a:endParaRPr lang="en-US" sz="2400" i="1" dirty="0">
+              <a:solidFill>
+                <a:schemeClr val="tx1"/>
+              </a:solidFill>
+              <a:latin typeface="Arial" panose="020B0604020202020204" pitchFamily="34" charset="0"/>
+              <a:cs typeface="Arial" panose="020B0604020202020204" pitchFamily="34" charset="0"/>
+            </a:endParaRPr>
+          </a:p>
+        </p:txBody>
+      </p:sp>
+      <p:sp>
+        <p:nvSpPr>
+          <p:cNvPr id="11" name="Rectangle 10">
+            <a:extLst>
+              <a:ext uri="{FF2B5EF4-FFF2-40B4-BE49-F238E27FC236}">
+                <a16:creationId xmlns:a16="http://schemas.microsoft.com/office/drawing/2014/main" id="{612EA15D-68B8-4207-39F2-1F2B218F4B4D}"/>
+              </a:ext>
+            </a:extLst>
+          </p:cNvPr>
+          <p:cNvSpPr/>
+          <p:nvPr/>
+        </p:nvSpPr>
+        <p:spPr>
+          <a:xfrm>
+            <a:off x="19032813" y="11773838"/>
+            <a:ext cx="1819398" cy="877223"/>
+          </a:xfrm>
+          <a:prstGeom prst="rect">
+            <a:avLst/>
+          </a:prstGeom>
+          <a:solidFill>
+            <a:schemeClr val="bg1"/>
+          </a:solidFill>
+          <a:ln w="38100">
+            <a:solidFill>
+              <a:schemeClr val="tx1"/>
+            </a:solidFill>
+          </a:ln>
+        </p:spPr>
+        <p:style>
+          <a:lnRef idx="2">
+            <a:schemeClr val="accent1">
+              <a:shade val="50000"/>
+            </a:schemeClr>
+          </a:lnRef>
+          <a:fillRef idx="1">
+            <a:schemeClr val="accent1"/>
+          </a:fillRef>
+          <a:effectRef idx="0">
+            <a:schemeClr val="accent1"/>
+          </a:effectRef>
+          <a:fontRef idx="minor">
+            <a:schemeClr val="lt1"/>
+          </a:fontRef>
+        </p:style>
+        <p:txBody>
+          <a:bodyPr rtlCol="0" anchor="ctr"/>
+          <a:lstStyle/>
+          <a:p>
+            <a:pPr algn="ctr"/>
+            <a:r>
+              <a:rPr lang="el-GR" sz="2400" b="1" i="1" dirty="0">
+                <a:solidFill>
+                  <a:schemeClr val="tx1"/>
+                </a:solidFill>
+                <a:latin typeface="Arial" panose="020B0604020202020204" pitchFamily="34" charset="0"/>
+                <a:cs typeface="Arial" panose="020B0604020202020204" pitchFamily="34" charset="0"/>
+              </a:rPr>
+              <a:t>Ν</a:t>
+            </a:r>
+            <a:r>
+              <a:rPr lang="en-US" sz="2400" b="1" baseline="-25000" dirty="0">
+                <a:solidFill>
+                  <a:schemeClr val="tx1"/>
+                </a:solidFill>
+                <a:latin typeface="Arial" panose="020B0604020202020204" pitchFamily="34" charset="0"/>
+                <a:cs typeface="Arial" panose="020B0604020202020204" pitchFamily="34" charset="0"/>
+              </a:rPr>
+              <a:t>area</a:t>
+            </a:r>
+            <a:endParaRPr lang="en-US" sz="2400" b="1" i="1" dirty="0">
+              <a:solidFill>
+                <a:schemeClr val="tx1"/>
+              </a:solidFill>
+              <a:latin typeface="Arial" panose="020B0604020202020204" pitchFamily="34" charset="0"/>
+              <a:cs typeface="Arial" panose="020B0604020202020204" pitchFamily="34" charset="0"/>
+            </a:endParaRPr>
+          </a:p>
+        </p:txBody>
+      </p:sp>
+      <p:sp>
+        <p:nvSpPr>
+          <p:cNvPr id="17" name="Rectangle 16">
+            <a:extLst>
+              <a:ext uri="{FF2B5EF4-FFF2-40B4-BE49-F238E27FC236}">
+                <a16:creationId xmlns:a16="http://schemas.microsoft.com/office/drawing/2014/main" id="{5CF0D2AF-8598-6EDA-181B-6A30A35A32CE}"/>
+              </a:ext>
+            </a:extLst>
+          </p:cNvPr>
+          <p:cNvSpPr/>
+          <p:nvPr/>
+        </p:nvSpPr>
+        <p:spPr>
+          <a:xfrm>
+            <a:off x="16755901" y="12813841"/>
+            <a:ext cx="1819398" cy="877223"/>
+          </a:xfrm>
+          <a:prstGeom prst="rect">
+            <a:avLst/>
+          </a:prstGeom>
+          <a:solidFill>
+            <a:schemeClr val="bg1"/>
+          </a:solidFill>
+          <a:ln w="38100">
+            <a:solidFill>
+              <a:schemeClr val="tx1"/>
+            </a:solidFill>
+          </a:ln>
+        </p:spPr>
+        <p:style>
+          <a:lnRef idx="2">
+            <a:schemeClr val="accent1">
+              <a:shade val="50000"/>
+            </a:schemeClr>
+          </a:lnRef>
+          <a:fillRef idx="1">
+            <a:schemeClr val="accent1"/>
+          </a:fillRef>
+          <a:effectRef idx="0">
+            <a:schemeClr val="accent1"/>
+          </a:effectRef>
+          <a:fontRef idx="minor">
+            <a:schemeClr val="lt1"/>
+          </a:fontRef>
+        </p:style>
+        <p:txBody>
+          <a:bodyPr rtlCol="0" anchor="ctr"/>
+          <a:lstStyle/>
+          <a:p>
+            <a:pPr algn="ctr"/>
+            <a:r>
+              <a:rPr lang="en-US" sz="2400" b="1" i="1" dirty="0">
+                <a:solidFill>
+                  <a:schemeClr val="tx1"/>
+                </a:solidFill>
+                <a:latin typeface="Arial" panose="020B0604020202020204" pitchFamily="34" charset="0"/>
+                <a:cs typeface="Arial" panose="020B0604020202020204" pitchFamily="34" charset="0"/>
+              </a:rPr>
+              <a:t>M</a:t>
+            </a:r>
+            <a:r>
+              <a:rPr lang="en-US" sz="2400" b="1" baseline="-25000" dirty="0">
+                <a:solidFill>
+                  <a:schemeClr val="tx1"/>
+                </a:solidFill>
+                <a:latin typeface="Arial" panose="020B0604020202020204" pitchFamily="34" charset="0"/>
+                <a:cs typeface="Arial" panose="020B0604020202020204" pitchFamily="34" charset="0"/>
+              </a:rPr>
+              <a:t>area</a:t>
+            </a:r>
+            <a:endParaRPr lang="en-US" sz="2400" b="1" i="1" dirty="0">
+              <a:solidFill>
+                <a:schemeClr val="tx1"/>
+              </a:solidFill>
+              <a:latin typeface="Arial" panose="020B0604020202020204" pitchFamily="34" charset="0"/>
+              <a:cs typeface="Arial" panose="020B0604020202020204" pitchFamily="34" charset="0"/>
+            </a:endParaRPr>
+          </a:p>
+        </p:txBody>
+      </p:sp>
+      <p:sp>
+        <p:nvSpPr>
+          <p:cNvPr id="20" name="Rectangle 19">
+            <a:extLst>
+              <a:ext uri="{FF2B5EF4-FFF2-40B4-BE49-F238E27FC236}">
+                <a16:creationId xmlns:a16="http://schemas.microsoft.com/office/drawing/2014/main" id="{27FC6D2D-F10F-B106-3C23-5AEBE11DFAC5}"/>
+              </a:ext>
+            </a:extLst>
+          </p:cNvPr>
+          <p:cNvSpPr/>
+          <p:nvPr/>
+        </p:nvSpPr>
+        <p:spPr>
+          <a:xfrm>
+            <a:off x="16755901" y="10712543"/>
+            <a:ext cx="1819398" cy="877223"/>
+          </a:xfrm>
+          <a:prstGeom prst="rect">
+            <a:avLst/>
+          </a:prstGeom>
+          <a:solidFill>
+            <a:schemeClr val="bg1"/>
+          </a:solidFill>
+          <a:ln w="38100">
+            <a:solidFill>
+              <a:schemeClr val="tx1"/>
+            </a:solidFill>
+          </a:ln>
+        </p:spPr>
+        <p:style>
+          <a:lnRef idx="2">
+            <a:schemeClr val="accent1">
+              <a:shade val="50000"/>
+            </a:schemeClr>
+          </a:lnRef>
+          <a:fillRef idx="1">
+            <a:schemeClr val="accent1"/>
+          </a:fillRef>
+          <a:effectRef idx="0">
+            <a:schemeClr val="accent1"/>
+          </a:effectRef>
+          <a:fontRef idx="minor">
+            <a:schemeClr val="lt1"/>
+          </a:fontRef>
+        </p:style>
+        <p:txBody>
+          <a:bodyPr rtlCol="0" anchor="ctr"/>
+          <a:lstStyle/>
+          <a:p>
+            <a:pPr algn="ctr"/>
+            <a:r>
+              <a:rPr lang="en-US" sz="2400" b="1" i="1" dirty="0">
+                <a:solidFill>
+                  <a:schemeClr val="tx1"/>
+                </a:solidFill>
+                <a:latin typeface="Arial" panose="020B0604020202020204" pitchFamily="34" charset="0"/>
+                <a:cs typeface="Arial" panose="020B0604020202020204" pitchFamily="34" charset="0"/>
+              </a:rPr>
+              <a:t>N</a:t>
+            </a:r>
+            <a:r>
+              <a:rPr lang="en-US" sz="2400" b="1" baseline="-25000" dirty="0">
+                <a:solidFill>
+                  <a:schemeClr val="tx1"/>
+                </a:solidFill>
+                <a:latin typeface="Arial" panose="020B0604020202020204" pitchFamily="34" charset="0"/>
+                <a:cs typeface="Arial" panose="020B0604020202020204" pitchFamily="34" charset="0"/>
+              </a:rPr>
+              <a:t>mass</a:t>
+            </a:r>
+            <a:endParaRPr lang="en-US" sz="2400" b="1" i="1" dirty="0">
+              <a:solidFill>
+                <a:schemeClr val="tx1"/>
+              </a:solidFill>
+              <a:latin typeface="Arial" panose="020B0604020202020204" pitchFamily="34" charset="0"/>
+              <a:cs typeface="Arial" panose="020B0604020202020204" pitchFamily="34" charset="0"/>
+            </a:endParaRPr>
+          </a:p>
+        </p:txBody>
+      </p:sp>
+      <p:sp>
+        <p:nvSpPr>
+          <p:cNvPr id="24" name="Rectangle 23">
+            <a:extLst>
+              <a:ext uri="{FF2B5EF4-FFF2-40B4-BE49-F238E27FC236}">
+                <a16:creationId xmlns:a16="http://schemas.microsoft.com/office/drawing/2014/main" id="{B27ADCE2-63D0-A5FF-CAAC-360272DBA0BD}"/>
+              </a:ext>
+            </a:extLst>
+          </p:cNvPr>
+          <p:cNvSpPr/>
+          <p:nvPr/>
+        </p:nvSpPr>
+        <p:spPr>
+          <a:xfrm>
+            <a:off x="14341211" y="11740675"/>
+            <a:ext cx="1819398" cy="877223"/>
+          </a:xfrm>
+          <a:prstGeom prst="rect">
+            <a:avLst/>
+          </a:prstGeom>
+          <a:solidFill>
+            <a:schemeClr val="bg1"/>
+          </a:solidFill>
+          <a:ln w="38100">
+            <a:solidFill>
+              <a:schemeClr val="tx1"/>
+            </a:solidFill>
+          </a:ln>
+        </p:spPr>
+        <p:style>
+          <a:lnRef idx="2">
+            <a:schemeClr val="accent1">
+              <a:shade val="50000"/>
+            </a:schemeClr>
+          </a:lnRef>
+          <a:fillRef idx="1">
+            <a:schemeClr val="accent1"/>
+          </a:fillRef>
+          <a:effectRef idx="0">
+            <a:schemeClr val="accent1"/>
+          </a:effectRef>
+          <a:fontRef idx="minor">
+            <a:schemeClr val="lt1"/>
+          </a:fontRef>
+        </p:style>
+        <p:txBody>
+          <a:bodyPr rtlCol="0" anchor="ctr"/>
+          <a:lstStyle/>
+          <a:p>
+            <a:pPr algn="ctr"/>
+            <a:r>
+              <a:rPr lang="en-US" sz="2400" b="1" i="1" dirty="0">
+                <a:solidFill>
+                  <a:schemeClr val="tx1"/>
+                </a:solidFill>
+                <a:latin typeface="Arial" panose="020B0604020202020204" pitchFamily="34" charset="0"/>
+                <a:cs typeface="Arial" panose="020B0604020202020204" pitchFamily="34" charset="0"/>
+              </a:rPr>
+              <a:t>C</a:t>
+            </a:r>
+            <a:r>
+              <a:rPr lang="en-US" sz="2400" b="1" baseline="-25000" dirty="0">
+                <a:solidFill>
+                  <a:schemeClr val="tx1"/>
+                </a:solidFill>
+                <a:latin typeface="Arial" panose="020B0604020202020204" pitchFamily="34" charset="0"/>
+                <a:cs typeface="Arial" panose="020B0604020202020204" pitchFamily="34" charset="0"/>
+              </a:rPr>
+              <a:t>i</a:t>
+            </a:r>
+            <a:r>
+              <a:rPr lang="en-US" sz="2400" b="1" i="1" dirty="0">
+                <a:solidFill>
+                  <a:schemeClr val="tx1"/>
+                </a:solidFill>
+                <a:latin typeface="Arial" panose="020B0604020202020204" pitchFamily="34" charset="0"/>
+                <a:cs typeface="Arial" panose="020B0604020202020204" pitchFamily="34" charset="0"/>
+              </a:rPr>
+              <a:t>:C</a:t>
+            </a:r>
+            <a:r>
+              <a:rPr lang="en-US" sz="2400" b="1" baseline="-25000" dirty="0">
+                <a:solidFill>
+                  <a:schemeClr val="tx1"/>
+                </a:solidFill>
+                <a:latin typeface="Arial" panose="020B0604020202020204" pitchFamily="34" charset="0"/>
+                <a:cs typeface="Arial" panose="020B0604020202020204" pitchFamily="34" charset="0"/>
+              </a:rPr>
+              <a:t>a</a:t>
+            </a:r>
+          </a:p>
+        </p:txBody>
+      </p:sp>
+      <p:sp>
+        <p:nvSpPr>
+          <p:cNvPr id="27" name="Rectangle 26">
+            <a:extLst>
+              <a:ext uri="{FF2B5EF4-FFF2-40B4-BE49-F238E27FC236}">
+                <a16:creationId xmlns:a16="http://schemas.microsoft.com/office/drawing/2014/main" id="{66815A72-A478-F607-8624-6D6512D0A23A}"/>
+              </a:ext>
+            </a:extLst>
+          </p:cNvPr>
+          <p:cNvSpPr/>
+          <p:nvPr/>
+        </p:nvSpPr>
+        <p:spPr>
+          <a:xfrm>
+            <a:off x="9153401" y="12824519"/>
+            <a:ext cx="2011416" cy="877223"/>
+          </a:xfrm>
+          <a:prstGeom prst="rect">
+            <a:avLst/>
+          </a:prstGeom>
+          <a:solidFill>
+            <a:schemeClr val="bg1"/>
+          </a:solidFill>
+          <a:ln w="38100">
+            <a:solidFill>
+              <a:schemeClr val="tx1"/>
+            </a:solidFill>
+          </a:ln>
+        </p:spPr>
+        <p:style>
+          <a:lnRef idx="2">
+            <a:schemeClr val="accent1">
+              <a:shade val="50000"/>
+            </a:schemeClr>
+          </a:lnRef>
+          <a:fillRef idx="1">
+            <a:schemeClr val="accent1"/>
+          </a:fillRef>
+          <a:effectRef idx="0">
+            <a:schemeClr val="accent1"/>
+          </a:effectRef>
+          <a:fontRef idx="minor">
+            <a:schemeClr val="lt1"/>
+          </a:fontRef>
+        </p:style>
+        <p:txBody>
+          <a:bodyPr rtlCol="0" anchor="ctr"/>
+          <a:lstStyle/>
+          <a:p>
+            <a:pPr algn="ctr"/>
+            <a:r>
+              <a:rPr lang="en-US" sz="2400" b="1" i="1" dirty="0">
+                <a:solidFill>
+                  <a:schemeClr val="tx1"/>
+                </a:solidFill>
+                <a:latin typeface="Arial" panose="020B0604020202020204" pitchFamily="34" charset="0"/>
+                <a:cs typeface="Arial" panose="020B0604020202020204" pitchFamily="34" charset="0"/>
+              </a:rPr>
+              <a:t>N availability</a:t>
+            </a:r>
+            <a:endParaRPr lang="en-US" sz="2400" b="1" dirty="0">
+              <a:solidFill>
+                <a:schemeClr val="tx1"/>
+              </a:solidFill>
+              <a:latin typeface="Arial" panose="020B0604020202020204" pitchFamily="34" charset="0"/>
+              <a:cs typeface="Arial" panose="020B0604020202020204" pitchFamily="34" charset="0"/>
+            </a:endParaRPr>
+          </a:p>
+        </p:txBody>
+      </p:sp>
+      <p:sp>
+        <p:nvSpPr>
+          <p:cNvPr id="63" name="Rectangle 62">
+            <a:extLst>
+              <a:ext uri="{FF2B5EF4-FFF2-40B4-BE49-F238E27FC236}">
+                <a16:creationId xmlns:a16="http://schemas.microsoft.com/office/drawing/2014/main" id="{A947E591-BFFA-7599-D68F-6084C1444072}"/>
+              </a:ext>
+            </a:extLst>
+          </p:cNvPr>
+          <p:cNvSpPr/>
+          <p:nvPr/>
+        </p:nvSpPr>
+        <p:spPr>
+          <a:xfrm>
+            <a:off x="8447284" y="9569757"/>
+            <a:ext cx="1819398" cy="877223"/>
+          </a:xfrm>
+          <a:prstGeom prst="rect">
+            <a:avLst/>
+          </a:prstGeom>
+          <a:solidFill>
+            <a:schemeClr val="bg1"/>
+          </a:solidFill>
+          <a:ln w="38100">
+            <a:solidFill>
+              <a:schemeClr val="tx1"/>
+            </a:solidFill>
+          </a:ln>
+        </p:spPr>
+        <p:style>
+          <a:lnRef idx="2">
+            <a:schemeClr val="accent1">
+              <a:shade val="50000"/>
+            </a:schemeClr>
+          </a:lnRef>
+          <a:fillRef idx="1">
+            <a:schemeClr val="accent1"/>
+          </a:fillRef>
+          <a:effectRef idx="0">
+            <a:schemeClr val="accent1"/>
+          </a:effectRef>
+          <a:fontRef idx="minor">
+            <a:schemeClr val="lt1"/>
+          </a:fontRef>
+        </p:style>
+        <p:txBody>
+          <a:bodyPr rtlCol="0" anchor="ctr"/>
+          <a:lstStyle/>
+          <a:p>
+            <a:pPr algn="ctr"/>
+            <a:r>
+              <a:rPr lang="en-US" sz="2400" b="1" i="1" dirty="0">
+                <a:solidFill>
+                  <a:schemeClr val="tx1"/>
+                </a:solidFill>
+                <a:latin typeface="Arial" panose="020B0604020202020204" pitchFamily="34" charset="0"/>
+                <a:cs typeface="Arial" panose="020B0604020202020204" pitchFamily="34" charset="0"/>
+              </a:rPr>
+              <a:t>% clay content</a:t>
+            </a:r>
+            <a:endParaRPr lang="en-US" sz="2400" i="1" dirty="0">
+              <a:solidFill>
+                <a:schemeClr val="tx1"/>
+              </a:solidFill>
+              <a:latin typeface="Arial" panose="020B0604020202020204" pitchFamily="34" charset="0"/>
+              <a:cs typeface="Arial" panose="020B0604020202020204" pitchFamily="34" charset="0"/>
+            </a:endParaRPr>
+          </a:p>
+        </p:txBody>
+      </p:sp>
+      <p:sp>
+        <p:nvSpPr>
+          <p:cNvPr id="12" name="Rectangle 11">
+            <a:extLst>
+              <a:ext uri="{FF2B5EF4-FFF2-40B4-BE49-F238E27FC236}">
+                <a16:creationId xmlns:a16="http://schemas.microsoft.com/office/drawing/2014/main" id="{80931944-38F4-9378-6003-83D1DE15C050}"/>
+              </a:ext>
+            </a:extLst>
+          </p:cNvPr>
+          <p:cNvSpPr/>
+          <p:nvPr/>
+        </p:nvSpPr>
+        <p:spPr>
+          <a:xfrm>
+            <a:off x="11612114" y="13707866"/>
+            <a:ext cx="1819398" cy="877223"/>
+          </a:xfrm>
+          <a:prstGeom prst="rect">
+            <a:avLst/>
+          </a:prstGeom>
+          <a:solidFill>
+            <a:schemeClr val="bg1"/>
+          </a:solidFill>
+          <a:ln w="38100">
+            <a:solidFill>
+              <a:schemeClr val="tx1"/>
+            </a:solidFill>
+          </a:ln>
+        </p:spPr>
+        <p:style>
+          <a:lnRef idx="2">
+            <a:schemeClr val="accent1">
+              <a:shade val="50000"/>
+            </a:schemeClr>
+          </a:lnRef>
+          <a:fillRef idx="1">
+            <a:schemeClr val="accent1"/>
+          </a:fillRef>
+          <a:effectRef idx="0">
+            <a:schemeClr val="accent1"/>
+          </a:effectRef>
+          <a:fontRef idx="minor">
+            <a:schemeClr val="lt1"/>
+          </a:fontRef>
+        </p:style>
+        <p:txBody>
+          <a:bodyPr rtlCol="0" anchor="ctr"/>
+          <a:lstStyle/>
+          <a:p>
+            <a:pPr algn="ctr"/>
+            <a:r>
+              <a:rPr lang="en-US" sz="2400" b="1" i="1" dirty="0">
+                <a:solidFill>
+                  <a:schemeClr val="tx1"/>
+                </a:solidFill>
+                <a:latin typeface="Arial" panose="020B0604020202020204" pitchFamily="34" charset="0"/>
+                <a:cs typeface="Arial" panose="020B0604020202020204" pitchFamily="34" charset="0"/>
+              </a:rPr>
+              <a:t>C</a:t>
+            </a:r>
+            <a:r>
+              <a:rPr lang="en-US" sz="2400" b="1" i="1" baseline="-25000" dirty="0">
+                <a:solidFill>
+                  <a:schemeClr val="tx1"/>
+                </a:solidFill>
+                <a:latin typeface="Arial" panose="020B0604020202020204" pitchFamily="34" charset="0"/>
+                <a:cs typeface="Arial" panose="020B0604020202020204" pitchFamily="34" charset="0"/>
+              </a:rPr>
+              <a:t>3</a:t>
+            </a:r>
+            <a:r>
+              <a:rPr lang="en-US" sz="2400" b="1" i="1" dirty="0">
+                <a:solidFill>
+                  <a:schemeClr val="tx1"/>
+                </a:solidFill>
+                <a:latin typeface="Arial" panose="020B0604020202020204" pitchFamily="34" charset="0"/>
+                <a:cs typeface="Arial" panose="020B0604020202020204" pitchFamily="34" charset="0"/>
+              </a:rPr>
+              <a:t> photo</a:t>
+            </a:r>
+            <a:r>
+              <a:rPr lang="en-US" sz="2400" b="1" dirty="0">
+                <a:solidFill>
+                  <a:schemeClr val="tx1"/>
+                </a:solidFill>
+                <a:latin typeface="Arial" panose="020B0604020202020204" pitchFamily="34" charset="0"/>
+                <a:cs typeface="Arial" panose="020B0604020202020204" pitchFamily="34" charset="0"/>
+              </a:rPr>
+              <a:t>.</a:t>
+            </a:r>
+            <a:endParaRPr lang="en-US" sz="2400" b="1" dirty="0">
+              <a:solidFill>
+                <a:srgbClr val="C00000"/>
+              </a:solidFill>
+              <a:latin typeface="Arial" panose="020B0604020202020204" pitchFamily="34" charset="0"/>
+              <a:cs typeface="Arial" panose="020B0604020202020204" pitchFamily="34" charset="0"/>
+            </a:endParaRPr>
+          </a:p>
+        </p:txBody>
+      </p:sp>
+      <p:sp>
+        <p:nvSpPr>
+          <p:cNvPr id="29" name="Rectangle 28">
+            <a:extLst>
+              <a:ext uri="{FF2B5EF4-FFF2-40B4-BE49-F238E27FC236}">
+                <a16:creationId xmlns:a16="http://schemas.microsoft.com/office/drawing/2014/main" id="{32327FC8-D9F4-D197-4681-DC89C3E206D2}"/>
+              </a:ext>
+            </a:extLst>
+          </p:cNvPr>
+          <p:cNvSpPr/>
+          <p:nvPr/>
+        </p:nvSpPr>
+        <p:spPr>
+          <a:xfrm>
+            <a:off x="9249410" y="10711560"/>
+            <a:ext cx="1819398" cy="877223"/>
+          </a:xfrm>
+          <a:prstGeom prst="rect">
+            <a:avLst/>
+          </a:prstGeom>
+          <a:solidFill>
+            <a:schemeClr val="bg1"/>
+          </a:solidFill>
+          <a:ln w="38100">
+            <a:solidFill>
+              <a:schemeClr val="tx1"/>
+            </a:solidFill>
+          </a:ln>
+        </p:spPr>
+        <p:style>
+          <a:lnRef idx="2">
+            <a:schemeClr val="accent1">
+              <a:shade val="50000"/>
+            </a:schemeClr>
+          </a:lnRef>
+          <a:fillRef idx="1">
+            <a:schemeClr val="accent1"/>
+          </a:fillRef>
+          <a:effectRef idx="0">
+            <a:schemeClr val="accent1"/>
+          </a:effectRef>
+          <a:fontRef idx="minor">
+            <a:schemeClr val="lt1"/>
+          </a:fontRef>
+        </p:style>
+        <p:txBody>
+          <a:bodyPr rtlCol="0" anchor="ctr"/>
+          <a:lstStyle/>
+          <a:p>
+            <a:pPr algn="ctr"/>
+            <a:r>
+              <a:rPr lang="en-US" sz="2400" b="1" i="1" dirty="0">
+                <a:solidFill>
+                  <a:schemeClr val="tx1"/>
+                </a:solidFill>
+                <a:latin typeface="Arial" panose="020B0604020202020204" pitchFamily="34" charset="0"/>
+                <a:cs typeface="Arial" panose="020B0604020202020204" pitchFamily="34" charset="0"/>
+              </a:rPr>
+              <a:t>Soil moisture</a:t>
+            </a:r>
+            <a:endParaRPr lang="en-US" sz="2400" b="1" dirty="0">
+              <a:solidFill>
+                <a:schemeClr val="tx1"/>
+              </a:solidFill>
+              <a:latin typeface="Arial" panose="020B0604020202020204" pitchFamily="34" charset="0"/>
+              <a:cs typeface="Arial" panose="020B0604020202020204" pitchFamily="34" charset="0"/>
+            </a:endParaRPr>
+          </a:p>
+        </p:txBody>
+      </p:sp>
+      <p:sp>
+        <p:nvSpPr>
+          <p:cNvPr id="22" name="Rectangle 21">
+            <a:extLst>
+              <a:ext uri="{FF2B5EF4-FFF2-40B4-BE49-F238E27FC236}">
+                <a16:creationId xmlns:a16="http://schemas.microsoft.com/office/drawing/2014/main" id="{A80C041E-0131-071A-4799-F8F798234F95}"/>
+              </a:ext>
+            </a:extLst>
+          </p:cNvPr>
+          <p:cNvSpPr/>
+          <p:nvPr/>
+        </p:nvSpPr>
+        <p:spPr>
+          <a:xfrm>
+            <a:off x="13842977" y="9774814"/>
+            <a:ext cx="1819398" cy="877223"/>
+          </a:xfrm>
+          <a:prstGeom prst="rect">
+            <a:avLst/>
+          </a:prstGeom>
+          <a:solidFill>
+            <a:schemeClr val="bg1"/>
+          </a:solidFill>
+          <a:ln w="38100">
+            <a:solidFill>
+              <a:schemeClr val="tx1"/>
+            </a:solidFill>
+          </a:ln>
+        </p:spPr>
+        <p:style>
+          <a:lnRef idx="2">
+            <a:schemeClr val="accent1">
+              <a:shade val="50000"/>
+            </a:schemeClr>
+          </a:lnRef>
+          <a:fillRef idx="1">
+            <a:schemeClr val="accent1"/>
+          </a:fillRef>
+          <a:effectRef idx="0">
+            <a:schemeClr val="accent1"/>
+          </a:effectRef>
+          <a:fontRef idx="minor">
+            <a:schemeClr val="lt1"/>
+          </a:fontRef>
+        </p:style>
+        <p:txBody>
+          <a:bodyPr rtlCol="0" anchor="ctr"/>
+          <a:lstStyle/>
+          <a:p>
+            <a:pPr algn="ctr"/>
+            <a:r>
+              <a:rPr lang="en-US" sz="2400" b="1" i="1" dirty="0">
+                <a:solidFill>
+                  <a:schemeClr val="tx1"/>
+                </a:solidFill>
+                <a:latin typeface="Arial" panose="020B0604020202020204" pitchFamily="34" charset="0"/>
+                <a:cs typeface="Arial" panose="020B0604020202020204" pitchFamily="34" charset="0"/>
+              </a:rPr>
+              <a:t>VPD</a:t>
+            </a:r>
+            <a:endParaRPr lang="en-US" sz="2400" b="1" dirty="0">
+              <a:solidFill>
+                <a:schemeClr val="tx1"/>
+              </a:solidFill>
+              <a:latin typeface="Arial" panose="020B0604020202020204" pitchFamily="34" charset="0"/>
+              <a:cs typeface="Arial" panose="020B0604020202020204" pitchFamily="34" charset="0"/>
+            </a:endParaRPr>
+          </a:p>
+        </p:txBody>
+      </p:sp>
     </p:spTree>
     <p:extLst>
       <p:ext uri="{BB962C8B-B14F-4D97-AF65-F5344CB8AC3E}">

</xml_diff>

<commit_message>
add SEM diagram revisions and upload copy of ms as sent to Nick and Helen for revisions
</commit_message>
<xml_diff>
--- a/working_drafts/figs/TXeco_fig5_SEM.pptx
+++ b/working_drafts/figs/TXeco_fig5_SEM.pptx
@@ -201,7 +201,7 @@
           <a:p>
             <a:fld id="{9C8338E3-F40D-F146-8D3B-4726E84D5200}" type="datetimeFigureOut">
               <a:rPr lang="en-US" smtClean="0"/>
-              <a:t>9/22/23</a:t>
+              <a:t>9/25/23</a:t>
             </a:fld>
             <a:endParaRPr lang="en-US"/>
           </a:p>
@@ -1024,7 +1024,7 @@
           <a:p>
             <a:fld id="{D3A28AA4-801E-B147-9E5C-6E6DBA6E23D1}" type="datetimeFigureOut">
               <a:rPr lang="en-US" smtClean="0"/>
-              <a:t>9/22/23</a:t>
+              <a:t>9/25/23</a:t>
             </a:fld>
             <a:endParaRPr lang="en-US"/>
           </a:p>
@@ -1194,7 +1194,7 @@
           <a:p>
             <a:fld id="{D3A28AA4-801E-B147-9E5C-6E6DBA6E23D1}" type="datetimeFigureOut">
               <a:rPr lang="en-US" smtClean="0"/>
-              <a:t>9/22/23</a:t>
+              <a:t>9/25/23</a:t>
             </a:fld>
             <a:endParaRPr lang="en-US"/>
           </a:p>
@@ -1374,7 +1374,7 @@
           <a:p>
             <a:fld id="{D3A28AA4-801E-B147-9E5C-6E6DBA6E23D1}" type="datetimeFigureOut">
               <a:rPr lang="en-US" smtClean="0"/>
-              <a:t>9/22/23</a:t>
+              <a:t>9/25/23</a:t>
             </a:fld>
             <a:endParaRPr lang="en-US"/>
           </a:p>
@@ -1544,7 +1544,7 @@
           <a:p>
             <a:fld id="{D3A28AA4-801E-B147-9E5C-6E6DBA6E23D1}" type="datetimeFigureOut">
               <a:rPr lang="en-US" smtClean="0"/>
-              <a:t>9/22/23</a:t>
+              <a:t>9/25/23</a:t>
             </a:fld>
             <a:endParaRPr lang="en-US"/>
           </a:p>
@@ -1788,7 +1788,7 @@
           <a:p>
             <a:fld id="{D3A28AA4-801E-B147-9E5C-6E6DBA6E23D1}" type="datetimeFigureOut">
               <a:rPr lang="en-US" smtClean="0"/>
-              <a:t>9/22/23</a:t>
+              <a:t>9/25/23</a:t>
             </a:fld>
             <a:endParaRPr lang="en-US"/>
           </a:p>
@@ -2020,7 +2020,7 @@
           <a:p>
             <a:fld id="{D3A28AA4-801E-B147-9E5C-6E6DBA6E23D1}" type="datetimeFigureOut">
               <a:rPr lang="en-US" smtClean="0"/>
-              <a:t>9/22/23</a:t>
+              <a:t>9/25/23</a:t>
             </a:fld>
             <a:endParaRPr lang="en-US"/>
           </a:p>
@@ -2387,7 +2387,7 @@
           <a:p>
             <a:fld id="{D3A28AA4-801E-B147-9E5C-6E6DBA6E23D1}" type="datetimeFigureOut">
               <a:rPr lang="en-US" smtClean="0"/>
-              <a:t>9/22/23</a:t>
+              <a:t>9/25/23</a:t>
             </a:fld>
             <a:endParaRPr lang="en-US"/>
           </a:p>
@@ -2505,7 +2505,7 @@
           <a:p>
             <a:fld id="{D3A28AA4-801E-B147-9E5C-6E6DBA6E23D1}" type="datetimeFigureOut">
               <a:rPr lang="en-US" smtClean="0"/>
-              <a:t>9/22/23</a:t>
+              <a:t>9/25/23</a:t>
             </a:fld>
             <a:endParaRPr lang="en-US"/>
           </a:p>
@@ -2600,7 +2600,7 @@
           <a:p>
             <a:fld id="{D3A28AA4-801E-B147-9E5C-6E6DBA6E23D1}" type="datetimeFigureOut">
               <a:rPr lang="en-US" smtClean="0"/>
-              <a:t>9/22/23</a:t>
+              <a:t>9/25/23</a:t>
             </a:fld>
             <a:endParaRPr lang="en-US"/>
           </a:p>
@@ -2877,7 +2877,7 @@
           <a:p>
             <a:fld id="{D3A28AA4-801E-B147-9E5C-6E6DBA6E23D1}" type="datetimeFigureOut">
               <a:rPr lang="en-US" smtClean="0"/>
-              <a:t>9/22/23</a:t>
+              <a:t>9/25/23</a:t>
             </a:fld>
             <a:endParaRPr lang="en-US"/>
           </a:p>
@@ -3134,7 +3134,7 @@
           <a:p>
             <a:fld id="{D3A28AA4-801E-B147-9E5C-6E6DBA6E23D1}" type="datetimeFigureOut">
               <a:rPr lang="en-US" smtClean="0"/>
-              <a:t>9/22/23</a:t>
+              <a:t>9/25/23</a:t>
             </a:fld>
             <a:endParaRPr lang="en-US"/>
           </a:p>
@@ -3347,7 +3347,7 @@
           <a:p>
             <a:fld id="{D3A28AA4-801E-B147-9E5C-6E6DBA6E23D1}" type="datetimeFigureOut">
               <a:rPr lang="en-US" smtClean="0"/>
-              <a:t>9/22/23</a:t>
+              <a:t>9/25/23</a:t>
             </a:fld>
             <a:endParaRPr lang="en-US"/>
           </a:p>
@@ -15336,9 +15336,7 @@
           </a:prstGeom>
           <a:ln w="76200">
             <a:solidFill>
-              <a:schemeClr val="accent1">
-                <a:lumMod val="75000"/>
-              </a:schemeClr>
+              <a:srgbClr val="C00000"/>
             </a:solidFill>
             <a:tailEnd type="triangle"/>
           </a:ln>
@@ -16268,9 +16266,7 @@
           </a:solidFill>
           <a:ln w="28575">
             <a:solidFill>
-              <a:schemeClr val="accent1">
-                <a:lumMod val="75000"/>
-              </a:schemeClr>
+              <a:srgbClr val="C00000"/>
             </a:solidFill>
           </a:ln>
         </p:spPr>

</xml_diff>